<commit_message>
git: Tweak tours 7, 8
</commit_message>
<xml_diff>
--- a/diagrams/gitAndGithub/branch/branchesAsLabels.pptx
+++ b/diagrams/gitAndGithub/branch/branchesAsLabels.pptx
@@ -210,7 +210,7 @@
           <a:p>
             <a:fld id="{2D7B8176-A568-4DE8-B695-28BCA3CC2636}" type="datetimeFigureOut">
               <a:rPr lang="en-US" smtClean="0"/>
-              <a:t>7/8/25</a:t>
+              <a:t>7/31/25</a:t>
             </a:fld>
             <a:endParaRPr lang="en-US"/>
           </a:p>
@@ -561,6 +561,90 @@
 </p:notes>
 </file>
 
+<file path=ppt/notesSlides/notesSlide2.xml><?xml version="1.0" encoding="utf-8"?>
+<p:notes xmlns:a="http://schemas.openxmlformats.org/drawingml/2006/main" xmlns:r="http://schemas.openxmlformats.org/officeDocument/2006/relationships" xmlns:p="http://schemas.openxmlformats.org/presentationml/2006/main">
+  <p:cSld>
+    <p:spTree>
+      <p:nvGrpSpPr>
+        <p:cNvPr id="1" name=""/>
+        <p:cNvGrpSpPr/>
+        <p:nvPr/>
+      </p:nvGrpSpPr>
+      <p:grpSpPr>
+        <a:xfrm>
+          <a:off x="0" y="0"/>
+          <a:ext cx="0" cy="0"/>
+          <a:chOff x="0" y="0"/>
+          <a:chExt cx="0" cy="0"/>
+        </a:xfrm>
+      </p:grpSpPr>
+      <p:sp>
+        <p:nvSpPr>
+          <p:cNvPr id="2" name="Slide Image Placeholder 1"/>
+          <p:cNvSpPr>
+            <a:spLocks noGrp="1" noRot="1" noChangeAspect="1"/>
+          </p:cNvSpPr>
+          <p:nvPr>
+            <p:ph type="sldImg"/>
+          </p:nvPr>
+        </p:nvSpPr>
+        <p:spPr/>
+      </p:sp>
+      <p:sp>
+        <p:nvSpPr>
+          <p:cNvPr id="3" name="Notes Placeholder 2"/>
+          <p:cNvSpPr>
+            <a:spLocks noGrp="1"/>
+          </p:cNvSpPr>
+          <p:nvPr>
+            <p:ph type="body" idx="1"/>
+          </p:nvPr>
+        </p:nvSpPr>
+        <p:spPr/>
+        <p:txBody>
+          <a:bodyPr/>
+          <a:lstStyle/>
+          <a:p>
+            <a:endParaRPr lang="en-US" dirty="0"/>
+          </a:p>
+        </p:txBody>
+      </p:sp>
+      <p:sp>
+        <p:nvSpPr>
+          <p:cNvPr id="4" name="Slide Number Placeholder 3"/>
+          <p:cNvSpPr>
+            <a:spLocks noGrp="1"/>
+          </p:cNvSpPr>
+          <p:nvPr>
+            <p:ph type="sldNum" sz="quarter" idx="5"/>
+          </p:nvPr>
+        </p:nvSpPr>
+        <p:spPr/>
+        <p:txBody>
+          <a:bodyPr/>
+          <a:lstStyle/>
+          <a:p>
+            <a:fld id="{A3DC1A15-39B4-47B8-88A9-4197543062D7}" type="slidenum">
+              <a:rPr lang="en-US" smtClean="0"/>
+              <a:t>2</a:t>
+            </a:fld>
+            <a:endParaRPr lang="en-US"/>
+          </a:p>
+        </p:txBody>
+      </p:sp>
+    </p:spTree>
+    <p:extLst>
+      <p:ext uri="{BB962C8B-B14F-4D97-AF65-F5344CB8AC3E}">
+        <p14:creationId xmlns:p14="http://schemas.microsoft.com/office/powerpoint/2010/main" val="1007531904"/>
+      </p:ext>
+    </p:extLst>
+  </p:cSld>
+  <p:clrMapOvr>
+    <a:masterClrMapping/>
+  </p:clrMapOvr>
+</p:notes>
+</file>
+
 <file path=ppt/slideLayouts/slideLayout1.xml><?xml version="1.0" encoding="utf-8"?>
 <p:sldLayout xmlns:a="http://schemas.openxmlformats.org/drawingml/2006/main" xmlns:r="http://schemas.openxmlformats.org/officeDocument/2006/relationships" xmlns:p="http://schemas.openxmlformats.org/presentationml/2006/main" type="title" preserve="1">
   <p:cSld name="Title Slide">
@@ -742,7 +826,7 @@
           <a:p>
             <a:fld id="{A1F532DB-2311-4BA7-A4CB-CC15A84E776B}" type="datetimeFigureOut">
               <a:rPr lang="en-SG" smtClean="0"/>
-              <a:t>8/7/25</a:t>
+              <a:t>31/7/25</a:t>
             </a:fld>
             <a:endParaRPr lang="en-SG"/>
           </a:p>
@@ -912,7 +996,7 @@
           <a:p>
             <a:fld id="{A1F532DB-2311-4BA7-A4CB-CC15A84E776B}" type="datetimeFigureOut">
               <a:rPr lang="en-SG" smtClean="0"/>
-              <a:t>8/7/25</a:t>
+              <a:t>31/7/25</a:t>
             </a:fld>
             <a:endParaRPr lang="en-SG"/>
           </a:p>
@@ -1092,7 +1176,7 @@
           <a:p>
             <a:fld id="{A1F532DB-2311-4BA7-A4CB-CC15A84E776B}" type="datetimeFigureOut">
               <a:rPr lang="en-SG" smtClean="0"/>
-              <a:t>8/7/25</a:t>
+              <a:t>31/7/25</a:t>
             </a:fld>
             <a:endParaRPr lang="en-SG"/>
           </a:p>
@@ -1262,7 +1346,7 @@
           <a:p>
             <a:fld id="{A1F532DB-2311-4BA7-A4CB-CC15A84E776B}" type="datetimeFigureOut">
               <a:rPr lang="en-SG" smtClean="0"/>
-              <a:t>8/7/25</a:t>
+              <a:t>31/7/25</a:t>
             </a:fld>
             <a:endParaRPr lang="en-SG"/>
           </a:p>
@@ -1508,7 +1592,7 @@
           <a:p>
             <a:fld id="{A1F532DB-2311-4BA7-A4CB-CC15A84E776B}" type="datetimeFigureOut">
               <a:rPr lang="en-SG" smtClean="0"/>
-              <a:t>8/7/25</a:t>
+              <a:t>31/7/25</a:t>
             </a:fld>
             <a:endParaRPr lang="en-SG"/>
           </a:p>
@@ -1796,7 +1880,7 @@
           <a:p>
             <a:fld id="{A1F532DB-2311-4BA7-A4CB-CC15A84E776B}" type="datetimeFigureOut">
               <a:rPr lang="en-SG" smtClean="0"/>
-              <a:t>8/7/25</a:t>
+              <a:t>31/7/25</a:t>
             </a:fld>
             <a:endParaRPr lang="en-SG"/>
           </a:p>
@@ -2218,7 +2302,7 @@
           <a:p>
             <a:fld id="{A1F532DB-2311-4BA7-A4CB-CC15A84E776B}" type="datetimeFigureOut">
               <a:rPr lang="en-SG" smtClean="0"/>
-              <a:t>8/7/25</a:t>
+              <a:t>31/7/25</a:t>
             </a:fld>
             <a:endParaRPr lang="en-SG"/>
           </a:p>
@@ -2336,7 +2420,7 @@
           <a:p>
             <a:fld id="{A1F532DB-2311-4BA7-A4CB-CC15A84E776B}" type="datetimeFigureOut">
               <a:rPr lang="en-SG" smtClean="0"/>
-              <a:t>8/7/25</a:t>
+              <a:t>31/7/25</a:t>
             </a:fld>
             <a:endParaRPr lang="en-SG"/>
           </a:p>
@@ -2431,7 +2515,7 @@
           <a:p>
             <a:fld id="{A1F532DB-2311-4BA7-A4CB-CC15A84E776B}" type="datetimeFigureOut">
               <a:rPr lang="en-SG" smtClean="0"/>
-              <a:t>8/7/25</a:t>
+              <a:t>31/7/25</a:t>
             </a:fld>
             <a:endParaRPr lang="en-SG"/>
           </a:p>
@@ -2708,7 +2792,7 @@
           <a:p>
             <a:fld id="{A1F532DB-2311-4BA7-A4CB-CC15A84E776B}" type="datetimeFigureOut">
               <a:rPr lang="en-SG" smtClean="0"/>
-              <a:t>8/7/25</a:t>
+              <a:t>31/7/25</a:t>
             </a:fld>
             <a:endParaRPr lang="en-SG"/>
           </a:p>
@@ -2961,7 +3045,7 @@
           <a:p>
             <a:fld id="{A1F532DB-2311-4BA7-A4CB-CC15A84E776B}" type="datetimeFigureOut">
               <a:rPr lang="en-SG" smtClean="0"/>
-              <a:t>8/7/25</a:t>
+              <a:t>31/7/25</a:t>
             </a:fld>
             <a:endParaRPr lang="en-SG"/>
           </a:p>
@@ -3174,7 +3258,7 @@
           <a:p>
             <a:fld id="{A1F532DB-2311-4BA7-A4CB-CC15A84E776B}" type="datetimeFigureOut">
               <a:rPr lang="en-SG" smtClean="0"/>
-              <a:t>8/7/25</a:t>
+              <a:t>31/7/25</a:t>
             </a:fld>
             <a:endParaRPr lang="en-SG"/>
           </a:p>
@@ -5968,10 +6052,10 @@
       </p:grpSpPr>
       <p:grpSp>
         <p:nvGrpSpPr>
-          <p:cNvPr id="29" name="Group 28">
+          <p:cNvPr id="4" name="Group 3">
             <a:extLst>
               <a:ext uri="{FF2B5EF4-FFF2-40B4-BE49-F238E27FC236}">
-                <a16:creationId xmlns:a16="http://schemas.microsoft.com/office/drawing/2014/main" id="{E51B1F5D-43B2-B818-8F63-26D0704E5835}"/>
+                <a16:creationId xmlns:a16="http://schemas.microsoft.com/office/drawing/2014/main" id="{4EA1EE48-2649-8171-B618-5ED193A14CEF}"/>
               </a:ext>
             </a:extLst>
           </p:cNvPr>
@@ -5981,9 +6065,9 @@
         <p:grpSpPr>
           <a:xfrm>
             <a:off x="125892" y="3224893"/>
-            <a:ext cx="5073811" cy="3287970"/>
+            <a:ext cx="5801395" cy="3287970"/>
             <a:chOff x="125892" y="3224893"/>
-            <a:chExt cx="5073811" cy="3287970"/>
+            <a:chExt cx="5801395" cy="3287970"/>
           </a:xfrm>
         </p:grpSpPr>
         <p:sp>
@@ -6983,10 +7067,10 @@
           </p:nvGrpSpPr>
           <p:grpSpPr>
             <a:xfrm>
-              <a:off x="3117622" y="4424631"/>
-              <a:ext cx="705490" cy="674943"/>
-              <a:chOff x="3119841" y="4177959"/>
-              <a:chExt cx="705490" cy="674943"/>
+              <a:off x="3195142" y="4433266"/>
+              <a:ext cx="1420813" cy="828570"/>
+              <a:chOff x="2404518" y="4177959"/>
+              <a:chExt cx="1420813" cy="828570"/>
             </a:xfrm>
           </p:grpSpPr>
           <p:sp>
@@ -7085,15 +7169,16 @@
                 </a:extLst>
               </p:cNvPr>
               <p:cNvCxnSpPr>
-                <a:stCxn id="7" idx="7"/>
+                <a:cxnSpLocks/>
+                <a:stCxn id="7" idx="6"/>
                 <a:endCxn id="11" idx="3"/>
               </p:cNvCxnSpPr>
               <p:nvPr/>
             </p:nvCxnSpPr>
             <p:spPr>
               <a:xfrm flipV="1">
-                <a:off x="3119841" y="4569694"/>
-                <a:ext cx="253669" cy="283208"/>
+                <a:off x="2404518" y="4569694"/>
+                <a:ext cx="968992" cy="436835"/>
               </a:xfrm>
               <a:prstGeom prst="line">
                 <a:avLst/>
@@ -7138,7 +7223,7 @@
           </p:nvSpPr>
           <p:spPr>
             <a:xfrm flipH="1">
-              <a:off x="3944346" y="3340094"/>
+              <a:off x="4671930" y="3340094"/>
               <a:ext cx="607226" cy="369332"/>
             </a:xfrm>
             <a:prstGeom prst="rightArrow">
@@ -7213,7 +7298,7 @@
           </p:nvSpPr>
           <p:spPr>
             <a:xfrm>
-              <a:off x="4581694" y="3334162"/>
+              <a:off x="5309278" y="3334162"/>
               <a:ext cx="618009" cy="375073"/>
             </a:xfrm>
             <a:prstGeom prst="roundRect">
@@ -7420,10 +7505,10 @@
           </p:nvGrpSpPr>
           <p:grpSpPr>
             <a:xfrm>
-              <a:off x="3305035" y="3294707"/>
-              <a:ext cx="529341" cy="1129924"/>
+              <a:off x="4081779" y="3294707"/>
+              <a:ext cx="529341" cy="1138559"/>
               <a:chOff x="3197162" y="4007214"/>
-              <a:chExt cx="529341" cy="1129924"/>
+              <a:chExt cx="529341" cy="1138559"/>
             </a:xfrm>
           </p:grpSpPr>
           <p:sp>
@@ -7534,9 +7619,9 @@
               <p:nvPr/>
             </p:nvCxnSpPr>
             <p:spPr>
-              <a:xfrm flipV="1">
-                <a:off x="3450569" y="4466160"/>
-                <a:ext cx="11264" cy="670978"/>
+              <a:xfrm flipH="1" flipV="1">
+                <a:off x="3461833" y="4466160"/>
+                <a:ext cx="4835" cy="679613"/>
               </a:xfrm>
               <a:prstGeom prst="line">
                 <a:avLst/>
@@ -7579,7 +7664,7 @@
           </p:nvSpPr>
           <p:spPr>
             <a:xfrm flipH="1">
-              <a:off x="3944346" y="3904476"/>
+              <a:off x="3244456" y="3886884"/>
               <a:ext cx="850689" cy="369332"/>
             </a:xfrm>
             <a:prstGeom prst="rightArrow">

</xml_diff>

<commit_message>
git: Update layout of branching illustration
</commit_message>
<xml_diff>
--- a/diagrams/gitAndGithub/branch/branchesAsLabels.pptx
+++ b/diagrams/gitAndGithub/branch/branchesAsLabels.pptx
@@ -210,7 +210,7 @@
           <a:p>
             <a:fld id="{2D7B8176-A568-4DE8-B695-28BCA3CC2636}" type="datetimeFigureOut">
               <a:rPr lang="en-US" smtClean="0"/>
-              <a:t>7/31/25</a:t>
+              <a:t>9/25/25</a:t>
             </a:fld>
             <a:endParaRPr lang="en-US"/>
           </a:p>
@@ -826,7 +826,7 @@
           <a:p>
             <a:fld id="{A1F532DB-2311-4BA7-A4CB-CC15A84E776B}" type="datetimeFigureOut">
               <a:rPr lang="en-SG" smtClean="0"/>
-              <a:t>31/7/25</a:t>
+              <a:t>25/9/25</a:t>
             </a:fld>
             <a:endParaRPr lang="en-SG"/>
           </a:p>
@@ -996,7 +996,7 @@
           <a:p>
             <a:fld id="{A1F532DB-2311-4BA7-A4CB-CC15A84E776B}" type="datetimeFigureOut">
               <a:rPr lang="en-SG" smtClean="0"/>
-              <a:t>31/7/25</a:t>
+              <a:t>25/9/25</a:t>
             </a:fld>
             <a:endParaRPr lang="en-SG"/>
           </a:p>
@@ -1176,7 +1176,7 @@
           <a:p>
             <a:fld id="{A1F532DB-2311-4BA7-A4CB-CC15A84E776B}" type="datetimeFigureOut">
               <a:rPr lang="en-SG" smtClean="0"/>
-              <a:t>31/7/25</a:t>
+              <a:t>25/9/25</a:t>
             </a:fld>
             <a:endParaRPr lang="en-SG"/>
           </a:p>
@@ -1346,7 +1346,7 @@
           <a:p>
             <a:fld id="{A1F532DB-2311-4BA7-A4CB-CC15A84E776B}" type="datetimeFigureOut">
               <a:rPr lang="en-SG" smtClean="0"/>
-              <a:t>31/7/25</a:t>
+              <a:t>25/9/25</a:t>
             </a:fld>
             <a:endParaRPr lang="en-SG"/>
           </a:p>
@@ -1592,7 +1592,7 @@
           <a:p>
             <a:fld id="{A1F532DB-2311-4BA7-A4CB-CC15A84E776B}" type="datetimeFigureOut">
               <a:rPr lang="en-SG" smtClean="0"/>
-              <a:t>31/7/25</a:t>
+              <a:t>25/9/25</a:t>
             </a:fld>
             <a:endParaRPr lang="en-SG"/>
           </a:p>
@@ -1880,7 +1880,7 @@
           <a:p>
             <a:fld id="{A1F532DB-2311-4BA7-A4CB-CC15A84E776B}" type="datetimeFigureOut">
               <a:rPr lang="en-SG" smtClean="0"/>
-              <a:t>31/7/25</a:t>
+              <a:t>25/9/25</a:t>
             </a:fld>
             <a:endParaRPr lang="en-SG"/>
           </a:p>
@@ -2302,7 +2302,7 @@
           <a:p>
             <a:fld id="{A1F532DB-2311-4BA7-A4CB-CC15A84E776B}" type="datetimeFigureOut">
               <a:rPr lang="en-SG" smtClean="0"/>
-              <a:t>31/7/25</a:t>
+              <a:t>25/9/25</a:t>
             </a:fld>
             <a:endParaRPr lang="en-SG"/>
           </a:p>
@@ -2420,7 +2420,7 @@
           <a:p>
             <a:fld id="{A1F532DB-2311-4BA7-A4CB-CC15A84E776B}" type="datetimeFigureOut">
               <a:rPr lang="en-SG" smtClean="0"/>
-              <a:t>31/7/25</a:t>
+              <a:t>25/9/25</a:t>
             </a:fld>
             <a:endParaRPr lang="en-SG"/>
           </a:p>
@@ -2515,7 +2515,7 @@
           <a:p>
             <a:fld id="{A1F532DB-2311-4BA7-A4CB-CC15A84E776B}" type="datetimeFigureOut">
               <a:rPr lang="en-SG" smtClean="0"/>
-              <a:t>31/7/25</a:t>
+              <a:t>25/9/25</a:t>
             </a:fld>
             <a:endParaRPr lang="en-SG"/>
           </a:p>
@@ -2792,7 +2792,7 @@
           <a:p>
             <a:fld id="{A1F532DB-2311-4BA7-A4CB-CC15A84E776B}" type="datetimeFigureOut">
               <a:rPr lang="en-SG" smtClean="0"/>
-              <a:t>31/7/25</a:t>
+              <a:t>25/9/25</a:t>
             </a:fld>
             <a:endParaRPr lang="en-SG"/>
           </a:p>
@@ -3045,7 +3045,7 @@
           <a:p>
             <a:fld id="{A1F532DB-2311-4BA7-A4CB-CC15A84E776B}" type="datetimeFigureOut">
               <a:rPr lang="en-SG" smtClean="0"/>
-              <a:t>31/7/25</a:t>
+              <a:t>25/9/25</a:t>
             </a:fld>
             <a:endParaRPr lang="en-SG"/>
           </a:p>
@@ -3258,7 +3258,7 @@
           <a:p>
             <a:fld id="{A1F532DB-2311-4BA7-A4CB-CC15A84E776B}" type="datetimeFigureOut">
               <a:rPr lang="en-SG" smtClean="0"/>
-              <a:t>31/7/25</a:t>
+              <a:t>25/9/25</a:t>
             </a:fld>
             <a:endParaRPr lang="en-SG"/>
           </a:p>
@@ -3641,7 +3641,7 @@
         </p:nvSpPr>
         <p:spPr>
           <a:xfrm>
-            <a:off x="147200" y="3963976"/>
+            <a:off x="44516" y="6129112"/>
             <a:ext cx="529341" cy="458946"/>
           </a:xfrm>
           <a:prstGeom prst="flowChartConnector">
@@ -3721,7 +3721,7 @@
         </p:nvSpPr>
         <p:spPr>
           <a:xfrm flipH="1">
-            <a:off x="776919" y="4019384"/>
+            <a:off x="674235" y="6184520"/>
             <a:ext cx="850689" cy="369332"/>
           </a:xfrm>
           <a:prstGeom prst="rightArrow">
@@ -3793,7 +3793,7 @@
         </p:nvSpPr>
         <p:spPr>
           <a:xfrm>
-            <a:off x="1672207" y="4019384"/>
+            <a:off x="1569523" y="6184520"/>
             <a:ext cx="618009" cy="375073"/>
           </a:xfrm>
           <a:prstGeom prst="roundRect">
@@ -3854,13 +3854,15 @@
       <p:cxnSp>
         <p:nvCxnSpPr>
           <p:cNvPr id="89" name="Straight Connector 88"/>
-          <p:cNvCxnSpPr/>
+          <p:cNvCxnSpPr>
+            <a:cxnSpLocks/>
+          </p:cNvCxnSpPr>
           <p:nvPr/>
         </p:nvCxnSpPr>
         <p:spPr>
           <a:xfrm>
-            <a:off x="4644008" y="3963976"/>
-            <a:ext cx="0" cy="2606360"/>
+            <a:off x="7047395" y="4219832"/>
+            <a:ext cx="0" cy="2404955"/>
           </a:xfrm>
           <a:prstGeom prst="line">
             <a:avLst/>
@@ -3897,7 +3899,7 @@
         </p:nvSpPr>
         <p:spPr>
           <a:xfrm>
-            <a:off x="150652" y="5370533"/>
+            <a:off x="2554039" y="5370533"/>
             <a:ext cx="529341" cy="458946"/>
           </a:xfrm>
           <a:prstGeom prst="flowChartConnector">
@@ -3977,7 +3979,7 @@
         </p:nvSpPr>
         <p:spPr>
           <a:xfrm>
-            <a:off x="144167" y="6111390"/>
+            <a:off x="2547554" y="6111390"/>
             <a:ext cx="529341" cy="458946"/>
           </a:xfrm>
           <a:prstGeom prst="flowChartConnector">
@@ -4060,7 +4062,7 @@
         </p:nvCxnSpPr>
         <p:spPr>
           <a:xfrm flipV="1">
-            <a:off x="408838" y="5829479"/>
+            <a:off x="2812225" y="5829479"/>
             <a:ext cx="6485" cy="281911"/>
           </a:xfrm>
           <a:prstGeom prst="line">
@@ -4100,7 +4102,7 @@
         </p:nvSpPr>
         <p:spPr>
           <a:xfrm flipH="1">
-            <a:off x="761141" y="5409565"/>
+            <a:off x="3164528" y="5409565"/>
             <a:ext cx="850689" cy="369332"/>
           </a:xfrm>
           <a:prstGeom prst="rightArrow">
@@ -4172,7 +4174,7 @@
         </p:nvSpPr>
         <p:spPr>
           <a:xfrm>
-            <a:off x="1651856" y="5406694"/>
+            <a:off x="4055243" y="5406694"/>
             <a:ext cx="618009" cy="375073"/>
           </a:xfrm>
           <a:prstGeom prst="roundRect">
@@ -4233,13 +4235,15 @@
       <p:cxnSp>
         <p:nvCxnSpPr>
           <p:cNvPr id="33" name="Straight Connector 32"/>
-          <p:cNvCxnSpPr/>
+          <p:cNvCxnSpPr>
+            <a:cxnSpLocks/>
+          </p:cNvCxnSpPr>
           <p:nvPr/>
         </p:nvCxnSpPr>
         <p:spPr>
           <a:xfrm>
-            <a:off x="2411760" y="3861048"/>
-            <a:ext cx="0" cy="2801905"/>
+            <a:off x="4815147" y="4638808"/>
+            <a:ext cx="0" cy="2024145"/>
           </a:xfrm>
           <a:prstGeom prst="line">
             <a:avLst/>
@@ -4276,7 +4280,7 @@
         </p:nvSpPr>
         <p:spPr>
           <a:xfrm>
-            <a:off x="2613123" y="5353648"/>
+            <a:off x="5016510" y="5353648"/>
             <a:ext cx="529341" cy="458946"/>
           </a:xfrm>
           <a:prstGeom prst="flowChartConnector">
@@ -4356,7 +4360,7 @@
         </p:nvSpPr>
         <p:spPr>
           <a:xfrm>
-            <a:off x="2606638" y="6094505"/>
+            <a:off x="5010025" y="6094505"/>
             <a:ext cx="529341" cy="458946"/>
           </a:xfrm>
           <a:prstGeom prst="flowChartConnector">
@@ -4439,7 +4443,7 @@
         </p:nvCxnSpPr>
         <p:spPr>
           <a:xfrm flipV="1">
-            <a:off x="2871309" y="5812594"/>
+            <a:off x="5274696" y="5812594"/>
             <a:ext cx="6485" cy="281911"/>
           </a:xfrm>
           <a:prstGeom prst="line">
@@ -4479,7 +4483,7 @@
         </p:nvSpPr>
         <p:spPr>
           <a:xfrm flipH="1">
-            <a:off x="3198242" y="5168982"/>
+            <a:off x="5601629" y="5168982"/>
             <a:ext cx="850689" cy="369332"/>
           </a:xfrm>
           <a:prstGeom prst="rightArrow">
@@ -4551,7 +4555,7 @@
         </p:nvSpPr>
         <p:spPr>
           <a:xfrm>
-            <a:off x="3843600" y="5567694"/>
+            <a:off x="6246987" y="5567694"/>
             <a:ext cx="618009" cy="375073"/>
           </a:xfrm>
           <a:prstGeom prst="roundRect">
@@ -4619,7 +4623,7 @@
         </p:nvSpPr>
         <p:spPr>
           <a:xfrm flipH="1">
-            <a:off x="3210946" y="5564049"/>
+            <a:off x="5614333" y="5564049"/>
             <a:ext cx="607226" cy="369332"/>
           </a:xfrm>
           <a:prstGeom prst="rightArrow">
@@ -4688,7 +4692,7 @@
         </p:nvSpPr>
         <p:spPr>
           <a:xfrm>
-            <a:off x="4790463" y="5249337"/>
+            <a:off x="7193850" y="5249337"/>
             <a:ext cx="529341" cy="458946"/>
           </a:xfrm>
           <a:prstGeom prst="flowChartConnector">
@@ -4768,7 +4772,7 @@
         </p:nvSpPr>
         <p:spPr>
           <a:xfrm>
-            <a:off x="4783978" y="5990194"/>
+            <a:off x="7187365" y="5990194"/>
             <a:ext cx="529341" cy="458946"/>
           </a:xfrm>
           <a:prstGeom prst="flowChartConnector">
@@ -4851,7 +4855,7 @@
         </p:nvCxnSpPr>
         <p:spPr>
           <a:xfrm flipV="1">
-            <a:off x="5048649" y="5708283"/>
+            <a:off x="7452036" y="5708283"/>
             <a:ext cx="6485" cy="281911"/>
           </a:xfrm>
           <a:prstGeom prst="line">
@@ -4891,7 +4895,7 @@
         </p:nvGrpSpPr>
         <p:grpSpPr>
           <a:xfrm>
-            <a:off x="4779521" y="4415077"/>
+            <a:off x="7200876" y="4415077"/>
             <a:ext cx="529341" cy="834260"/>
             <a:chOff x="2338635" y="4018315"/>
             <a:chExt cx="529341" cy="834260"/>
@@ -4981,15 +4985,16 @@
           <p:nvCxnSpPr>
             <p:cNvPr id="58" name="Straight Connector 57"/>
             <p:cNvCxnSpPr>
+              <a:cxnSpLocks/>
               <a:stCxn id="42" idx="0"/>
               <a:endCxn id="55" idx="4"/>
             </p:cNvCxnSpPr>
             <p:nvPr/>
           </p:nvCxnSpPr>
           <p:spPr>
-            <a:xfrm flipH="1" flipV="1">
-              <a:off x="2603306" y="4477261"/>
-              <a:ext cx="10942" cy="375314"/>
+            <a:xfrm flipV="1">
+              <a:off x="2602458" y="4477261"/>
+              <a:ext cx="848" cy="375314"/>
             </a:xfrm>
             <a:prstGeom prst="line">
               <a:avLst/>
@@ -5028,7 +5033,7 @@
         </p:nvSpPr>
         <p:spPr>
           <a:xfrm flipH="1">
-            <a:off x="5392567" y="4457013"/>
+            <a:off x="7795954" y="4457013"/>
             <a:ext cx="607226" cy="369332"/>
           </a:xfrm>
           <a:prstGeom prst="rightArrow">
@@ -5097,7 +5102,7 @@
         </p:nvSpPr>
         <p:spPr>
           <a:xfrm flipH="1">
-            <a:off x="5400952" y="5288369"/>
+            <a:off x="7804339" y="5288369"/>
             <a:ext cx="850689" cy="369332"/>
           </a:xfrm>
           <a:prstGeom prst="rightArrow">
@@ -5169,7 +5174,7 @@
         </p:nvSpPr>
         <p:spPr>
           <a:xfrm>
-            <a:off x="6049700" y="4451272"/>
+            <a:off x="8453087" y="4451272"/>
             <a:ext cx="618009" cy="375073"/>
           </a:xfrm>
           <a:prstGeom prst="roundRect">
@@ -5227,600 +5232,15 @@
           </a:p>
         </p:txBody>
       </p:sp>
-      <p:cxnSp>
-        <p:nvCxnSpPr>
-          <p:cNvPr id="61" name="Straight Connector 60"/>
-          <p:cNvCxnSpPr/>
-          <p:nvPr/>
-        </p:nvCxnSpPr>
-        <p:spPr>
-          <a:xfrm flipH="1">
-            <a:off x="6852064" y="3963976"/>
-            <a:ext cx="24192" cy="2631464"/>
-          </a:xfrm>
-          <a:prstGeom prst="line">
-            <a:avLst/>
-          </a:prstGeom>
-          <a:ln w="19050">
-            <a:solidFill>
-              <a:schemeClr val="bg1">
-                <a:lumMod val="65000"/>
-              </a:schemeClr>
-            </a:solidFill>
-            <a:prstDash val="sysDash"/>
-          </a:ln>
-        </p:spPr>
-        <p:style>
-          <a:lnRef idx="1">
-            <a:schemeClr val="accent1"/>
-          </a:lnRef>
-          <a:fillRef idx="0">
-            <a:schemeClr val="accent1"/>
-          </a:fillRef>
-          <a:effectRef idx="0">
-            <a:schemeClr val="accent1"/>
-          </a:effectRef>
-          <a:fontRef idx="minor">
-            <a:schemeClr val="tx1"/>
-          </a:fontRef>
-        </p:style>
-      </p:cxnSp>
       <p:sp>
         <p:nvSpPr>
-          <p:cNvPr id="62" name="Flowchart: Connector 61"/>
+          <p:cNvPr id="72" name="Down Arrow 71"/>
           <p:cNvSpPr/>
           <p:nvPr/>
         </p:nvSpPr>
         <p:spPr>
-          <a:xfrm>
-            <a:off x="6998519" y="5274441"/>
-            <a:ext cx="529341" cy="458946"/>
-          </a:xfrm>
-          <a:prstGeom prst="flowChartConnector">
-            <a:avLst/>
-          </a:prstGeom>
-          <a:solidFill>
-            <a:schemeClr val="accent6"/>
-          </a:solidFill>
-          <a:ln>
-            <a:solidFill>
-              <a:schemeClr val="tx1"/>
-            </a:solidFill>
-          </a:ln>
-        </p:spPr>
-        <p:style>
-          <a:lnRef idx="2">
-            <a:schemeClr val="accent3">
-              <a:shade val="50000"/>
-            </a:schemeClr>
-          </a:lnRef>
-          <a:fillRef idx="1">
-            <a:schemeClr val="accent3"/>
-          </a:fillRef>
-          <a:effectRef idx="0">
-            <a:schemeClr val="accent3"/>
-          </a:effectRef>
-          <a:fontRef idx="minor">
-            <a:schemeClr val="lt1"/>
-          </a:fontRef>
-        </p:style>
-        <p:txBody>
-          <a:bodyPr rtlCol="0" anchor="ctr"/>
-          <a:lstStyle/>
-          <a:p>
-            <a:pPr marL="0" marR="0" lvl="0" indent="0" algn="ctr" defTabSz="914400" rtl="0" eaLnBrk="1" fontAlgn="auto" latinLnBrk="0" hangingPunct="1">
-              <a:lnSpc>
-                <a:spcPct val="100000"/>
-              </a:lnSpc>
-              <a:spcBef>
-                <a:spcPts val="0"/>
-              </a:spcBef>
-              <a:spcAft>
-                <a:spcPts val="0"/>
-              </a:spcAft>
-              <a:buClrTx/>
-              <a:buSzTx/>
-              <a:buFontTx/>
-              <a:buNone/>
-              <a:tabLst/>
-              <a:defRPr/>
-            </a:pPr>
-            <a:r>
-              <a:rPr kumimoji="0" lang="en-US" sz="1800" b="0" i="0" u="none" strike="noStrike" kern="1200" cap="none" spc="0" normalizeH="0" baseline="0" noProof="0" dirty="0">
-                <a:ln>
-                  <a:noFill/>
-                </a:ln>
-                <a:solidFill>
-                  <a:prstClr val="white"/>
-                </a:solidFill>
-                <a:effectLst/>
-                <a:uLnTx/>
-                <a:uFillTx/>
-                <a:latin typeface="Calibri"/>
-                <a:ea typeface="+mn-ea"/>
-                <a:cs typeface="+mn-cs"/>
-              </a:rPr>
-              <a:t>b</a:t>
-            </a:r>
-          </a:p>
-        </p:txBody>
-      </p:sp>
-      <p:sp>
-        <p:nvSpPr>
-          <p:cNvPr id="63" name="Flowchart: Connector 62"/>
-          <p:cNvSpPr/>
-          <p:nvPr/>
-        </p:nvSpPr>
-        <p:spPr>
-          <a:xfrm>
-            <a:off x="6992034" y="6015298"/>
-            <a:ext cx="529341" cy="458946"/>
-          </a:xfrm>
-          <a:prstGeom prst="flowChartConnector">
-            <a:avLst/>
-          </a:prstGeom>
-          <a:solidFill>
-            <a:schemeClr val="accent6"/>
-          </a:solidFill>
-          <a:ln>
-            <a:solidFill>
-              <a:schemeClr val="tx1"/>
-            </a:solidFill>
-          </a:ln>
-        </p:spPr>
-        <p:style>
-          <a:lnRef idx="2">
-            <a:schemeClr val="accent3">
-              <a:shade val="50000"/>
-            </a:schemeClr>
-          </a:lnRef>
-          <a:fillRef idx="1">
-            <a:schemeClr val="accent3"/>
-          </a:fillRef>
-          <a:effectRef idx="0">
-            <a:schemeClr val="accent3"/>
-          </a:effectRef>
-          <a:fontRef idx="minor">
-            <a:schemeClr val="lt1"/>
-          </a:fontRef>
-        </p:style>
-        <p:txBody>
-          <a:bodyPr rtlCol="0" anchor="ctr"/>
-          <a:lstStyle/>
-          <a:p>
-            <a:pPr marL="0" marR="0" lvl="0" indent="0" algn="ctr" defTabSz="914400" rtl="0" eaLnBrk="1" fontAlgn="auto" latinLnBrk="0" hangingPunct="1">
-              <a:lnSpc>
-                <a:spcPct val="100000"/>
-              </a:lnSpc>
-              <a:spcBef>
-                <a:spcPts val="0"/>
-              </a:spcBef>
-              <a:spcAft>
-                <a:spcPts val="0"/>
-              </a:spcAft>
-              <a:buClrTx/>
-              <a:buSzTx/>
-              <a:buFontTx/>
-              <a:buNone/>
-              <a:tabLst/>
-              <a:defRPr/>
-            </a:pPr>
-            <a:r>
-              <a:rPr kumimoji="0" lang="en-US" sz="1800" b="0" i="0" u="none" strike="noStrike" kern="1200" cap="none" spc="0" normalizeH="0" baseline="0" noProof="0" dirty="0">
-                <a:ln>
-                  <a:noFill/>
-                </a:ln>
-                <a:solidFill>
-                  <a:prstClr val="white"/>
-                </a:solidFill>
-                <a:effectLst/>
-                <a:uLnTx/>
-                <a:uFillTx/>
-                <a:latin typeface="Calibri"/>
-                <a:ea typeface="+mn-ea"/>
-                <a:cs typeface="+mn-cs"/>
-              </a:rPr>
-              <a:t>a</a:t>
-            </a:r>
-          </a:p>
-        </p:txBody>
-      </p:sp>
-      <p:cxnSp>
-        <p:nvCxnSpPr>
-          <p:cNvPr id="64" name="Straight Connector 63"/>
-          <p:cNvCxnSpPr>
-            <a:stCxn id="63" idx="0"/>
-            <a:endCxn id="62" idx="4"/>
-          </p:cNvCxnSpPr>
-          <p:nvPr/>
-        </p:nvCxnSpPr>
-        <p:spPr>
-          <a:xfrm flipV="1">
-            <a:off x="7256705" y="5733387"/>
-            <a:ext cx="6485" cy="281911"/>
-          </a:xfrm>
-          <a:prstGeom prst="line">
-            <a:avLst/>
-          </a:prstGeom>
-          <a:solidFill>
-            <a:srgbClr val="C00000"/>
-          </a:solidFill>
-          <a:ln>
-            <a:solidFill>
-              <a:schemeClr val="tx1"/>
-            </a:solidFill>
-          </a:ln>
-        </p:spPr>
-        <p:style>
-          <a:lnRef idx="2">
-            <a:schemeClr val="accent3">
-              <a:shade val="50000"/>
-            </a:schemeClr>
-          </a:lnRef>
-          <a:fillRef idx="1">
-            <a:schemeClr val="accent3"/>
-          </a:fillRef>
-          <a:effectRef idx="0">
-            <a:schemeClr val="accent3"/>
-          </a:effectRef>
-          <a:fontRef idx="minor">
-            <a:schemeClr val="lt1"/>
-          </a:fontRef>
-        </p:style>
-      </p:cxnSp>
-      <p:grpSp>
-        <p:nvGrpSpPr>
-          <p:cNvPr id="65" name="branch: commit 4"/>
-          <p:cNvGrpSpPr/>
-          <p:nvPr/>
-        </p:nvGrpSpPr>
-        <p:grpSpPr>
-          <a:xfrm>
-            <a:off x="6987577" y="4440181"/>
-            <a:ext cx="529341" cy="834260"/>
-            <a:chOff x="2338635" y="4018315"/>
-            <a:chExt cx="529341" cy="834260"/>
-          </a:xfrm>
-        </p:grpSpPr>
-        <p:sp>
-          <p:nvSpPr>
-            <p:cNvPr id="66" name="Flowchart: Connector 65"/>
-            <p:cNvSpPr/>
-            <p:nvPr/>
-          </p:nvSpPr>
-          <p:spPr>
-            <a:xfrm>
-              <a:off x="2338635" y="4018315"/>
-              <a:ext cx="529341" cy="458946"/>
-            </a:xfrm>
-            <a:prstGeom prst="flowChartConnector">
-              <a:avLst/>
-            </a:prstGeom>
-            <a:solidFill>
-              <a:srgbClr val="0070C0"/>
-            </a:solidFill>
-            <a:ln>
-              <a:solidFill>
-                <a:schemeClr val="tx1"/>
-              </a:solidFill>
-            </a:ln>
-          </p:spPr>
-          <p:style>
-            <a:lnRef idx="2">
-              <a:schemeClr val="accent3">
-                <a:shade val="50000"/>
-              </a:schemeClr>
-            </a:lnRef>
-            <a:fillRef idx="1">
-              <a:schemeClr val="accent3"/>
-            </a:fillRef>
-            <a:effectRef idx="0">
-              <a:schemeClr val="accent3"/>
-            </a:effectRef>
-            <a:fontRef idx="minor">
-              <a:schemeClr val="lt1"/>
-            </a:fontRef>
-          </p:style>
-          <p:txBody>
-            <a:bodyPr rtlCol="0" anchor="ctr"/>
-            <a:lstStyle/>
-            <a:p>
-              <a:pPr marL="0" marR="0" lvl="0" indent="0" algn="ctr" defTabSz="914400" rtl="0" eaLnBrk="1" fontAlgn="auto" latinLnBrk="0" hangingPunct="1">
-                <a:lnSpc>
-                  <a:spcPct val="100000"/>
-                </a:lnSpc>
-                <a:spcBef>
-                  <a:spcPts val="0"/>
-                </a:spcBef>
-                <a:spcAft>
-                  <a:spcPts val="0"/>
-                </a:spcAft>
-                <a:buClrTx/>
-                <a:buSzTx/>
-                <a:buFontTx/>
-                <a:buNone/>
-                <a:tabLst/>
-                <a:defRPr/>
-              </a:pPr>
-              <a:r>
-                <a:rPr kumimoji="0" lang="en-US" sz="1800" b="0" i="0" u="none" strike="noStrike" kern="1200" cap="none" spc="0" normalizeH="0" baseline="0" noProof="0" dirty="0">
-                  <a:ln>
-                    <a:noFill/>
-                  </a:ln>
-                  <a:solidFill>
-                    <a:prstClr val="white"/>
-                  </a:solidFill>
-                  <a:effectLst/>
-                  <a:uLnTx/>
-                  <a:uFillTx/>
-                  <a:latin typeface="Calibri"/>
-                  <a:ea typeface="+mn-ea"/>
-                  <a:cs typeface="+mn-cs"/>
-                </a:rPr>
-                <a:t>c</a:t>
-              </a:r>
-            </a:p>
-          </p:txBody>
-        </p:sp>
-        <p:cxnSp>
-          <p:nvCxnSpPr>
-            <p:cNvPr id="67" name="Straight Connector 66"/>
-            <p:cNvCxnSpPr>
-              <a:stCxn id="62" idx="0"/>
-              <a:endCxn id="66" idx="4"/>
-            </p:cNvCxnSpPr>
-            <p:nvPr/>
-          </p:nvCxnSpPr>
-          <p:spPr>
-            <a:xfrm flipH="1" flipV="1">
-              <a:off x="2603306" y="4477261"/>
-              <a:ext cx="10942" cy="375314"/>
-            </a:xfrm>
-            <a:prstGeom prst="line">
-              <a:avLst/>
-            </a:prstGeom>
-            <a:ln>
-              <a:solidFill>
-                <a:schemeClr val="tx1"/>
-              </a:solidFill>
-            </a:ln>
-          </p:spPr>
-          <p:style>
-            <a:lnRef idx="2">
-              <a:schemeClr val="accent3">
-                <a:shade val="50000"/>
-              </a:schemeClr>
-            </a:lnRef>
-            <a:fillRef idx="1">
-              <a:schemeClr val="accent3"/>
-            </a:fillRef>
-            <a:effectRef idx="0">
-              <a:schemeClr val="accent3"/>
-            </a:effectRef>
-            <a:fontRef idx="minor">
-              <a:schemeClr val="lt1"/>
-            </a:fontRef>
-          </p:style>
-        </p:cxnSp>
-      </p:grpSp>
-      <p:sp>
-        <p:nvSpPr>
-          <p:cNvPr id="68" name="InSlideAnimateShapef6670a49-3898-4e8c-8403-b30b80627c4a"/>
-          <p:cNvSpPr txBox="1">
-            <a:spLocks/>
-          </p:cNvSpPr>
-          <p:nvPr/>
-        </p:nvSpPr>
-        <p:spPr>
-          <a:xfrm flipH="1">
-            <a:off x="7600623" y="4482117"/>
-            <a:ext cx="607226" cy="369332"/>
-          </a:xfrm>
-          <a:prstGeom prst="rightArrow">
-            <a:avLst>
-              <a:gd name="adj1" fmla="val 100000"/>
-              <a:gd name="adj2" fmla="val 22939"/>
-            </a:avLst>
-          </a:prstGeom>
-          <a:solidFill>
-            <a:schemeClr val="tx1"/>
-          </a:solidFill>
-          <a:ln>
-            <a:solidFill>
-              <a:schemeClr val="tx1"/>
-            </a:solidFill>
-          </a:ln>
-        </p:spPr>
-        <p:txBody>
-          <a:bodyPr wrap="square" lIns="0" rIns="0" rtlCol="0">
-            <a:spAutoFit/>
-          </a:bodyPr>
-          <a:lstStyle/>
-          <a:p>
-            <a:pPr marL="0" marR="0" lvl="0" indent="0" algn="l" defTabSz="914400" rtl="0" eaLnBrk="1" fontAlgn="auto" latinLnBrk="0" hangingPunct="1">
-              <a:lnSpc>
-                <a:spcPct val="100000"/>
-              </a:lnSpc>
-              <a:spcBef>
-                <a:spcPts val="0"/>
-              </a:spcBef>
-              <a:spcAft>
-                <a:spcPts val="0"/>
-              </a:spcAft>
-              <a:buClrTx/>
-              <a:buSzTx/>
-              <a:buFontTx/>
-              <a:buNone/>
-              <a:tabLst/>
-              <a:defRPr/>
-            </a:pPr>
-            <a:r>
-              <a:rPr kumimoji="0" lang="en-US" sz="1800" b="0" i="0" u="none" strike="noStrike" kern="1200" cap="none" spc="0" normalizeH="0" baseline="0" noProof="0" dirty="0">
-                <a:ln>
-                  <a:noFill/>
-                </a:ln>
-                <a:solidFill>
-                  <a:srgbClr val="00B0F0"/>
-                </a:solidFill>
-                <a:effectLst/>
-                <a:uLnTx/>
-                <a:uFillTx/>
-                <a:latin typeface="Consolas" panose="020B0609020204030204" pitchFamily="49" charset="0"/>
-                <a:ea typeface="+mn-ea"/>
-                <a:cs typeface="+mn-cs"/>
-              </a:rPr>
-              <a:t>fix1</a:t>
-            </a:r>
-          </a:p>
-        </p:txBody>
-      </p:sp>
-      <p:sp>
-        <p:nvSpPr>
-          <p:cNvPr id="69" name="InSlideAnimateShape35e178af-dc40-47a5-bc21-4d0e6ab13a0b"/>
-          <p:cNvSpPr txBox="1"/>
-          <p:nvPr/>
-        </p:nvSpPr>
-        <p:spPr>
-          <a:xfrm flipH="1">
-            <a:off x="7609008" y="5313473"/>
-            <a:ext cx="850689" cy="369332"/>
-          </a:xfrm>
-          <a:prstGeom prst="rightArrow">
-            <a:avLst>
-              <a:gd name="adj1" fmla="val 100000"/>
-              <a:gd name="adj2" fmla="val 22939"/>
-            </a:avLst>
-          </a:prstGeom>
-          <a:solidFill>
-            <a:schemeClr val="tx1"/>
-          </a:solidFill>
-          <a:ln>
-            <a:solidFill>
-              <a:schemeClr val="tx1"/>
-            </a:solidFill>
-          </a:ln>
-        </p:spPr>
-        <p:txBody>
-          <a:bodyPr wrap="square" lIns="0" rIns="0" rtlCol="0">
-            <a:spAutoFit/>
-          </a:bodyPr>
-          <a:lstStyle/>
-          <a:p>
-            <a:pPr marL="0" marR="0" lvl="0" indent="0" algn="l" defTabSz="914400" rtl="0" eaLnBrk="1" fontAlgn="auto" latinLnBrk="0" hangingPunct="1">
-              <a:lnSpc>
-                <a:spcPct val="100000"/>
-              </a:lnSpc>
-              <a:spcBef>
-                <a:spcPts val="0"/>
-              </a:spcBef>
-              <a:spcAft>
-                <a:spcPts val="0"/>
-              </a:spcAft>
-              <a:buClrTx/>
-              <a:buSzTx/>
-              <a:buFontTx/>
-              <a:buNone/>
-              <a:tabLst/>
-              <a:defRPr/>
-            </a:pPr>
-            <a:r>
-              <a:rPr kumimoji="0" lang="en-US" sz="1800" b="0" i="0" u="none" strike="noStrike" kern="1200" cap="none" spc="0" normalizeH="0" baseline="0" noProof="0" dirty="0">
-                <a:ln>
-                  <a:noFill/>
-                </a:ln>
-                <a:solidFill>
-                  <a:srgbClr val="F79646">
-                    <a:lumMod val="60000"/>
-                    <a:lumOff val="40000"/>
-                  </a:srgbClr>
-                </a:solidFill>
-                <a:effectLst/>
-                <a:uLnTx/>
-                <a:uFillTx/>
-                <a:latin typeface="Consolas" panose="020B0609020204030204" pitchFamily="49" charset="0"/>
-                <a:ea typeface="+mn-ea"/>
-                <a:cs typeface="+mn-cs"/>
-              </a:rPr>
-              <a:t>master</a:t>
-            </a:r>
-          </a:p>
-        </p:txBody>
-      </p:sp>
-      <p:sp>
-        <p:nvSpPr>
-          <p:cNvPr id="70" name="InSlideAnimateShapec6668a60-df72-441d-a462-fbf247f668dd"/>
-          <p:cNvSpPr txBox="1"/>
-          <p:nvPr/>
-        </p:nvSpPr>
-        <p:spPr>
-          <a:xfrm>
-            <a:off x="8495990" y="5307732"/>
-            <a:ext cx="618009" cy="375073"/>
-          </a:xfrm>
-          <a:prstGeom prst="roundRect">
-            <a:avLst/>
-          </a:prstGeom>
-          <a:solidFill>
-            <a:schemeClr val="tx1"/>
-          </a:solidFill>
-          <a:ln>
-            <a:solidFill>
-              <a:schemeClr val="tx1"/>
-            </a:solidFill>
-          </a:ln>
-        </p:spPr>
-        <p:txBody>
-          <a:bodyPr wrap="square" lIns="0" tIns="0" rIns="0" bIns="0" rtlCol="0" anchor="ctr">
-            <a:noAutofit/>
-          </a:bodyPr>
-          <a:lstStyle/>
-          <a:p>
-            <a:pPr marL="0" marR="0" lvl="0" indent="0" algn="ctr" defTabSz="914400" rtl="0" eaLnBrk="1" fontAlgn="auto" latinLnBrk="0" hangingPunct="1">
-              <a:lnSpc>
-                <a:spcPct val="100000"/>
-              </a:lnSpc>
-              <a:spcBef>
-                <a:spcPts val="0"/>
-              </a:spcBef>
-              <a:spcAft>
-                <a:spcPts val="0"/>
-              </a:spcAft>
-              <a:buClrTx/>
-              <a:buSzTx/>
-              <a:buFontTx/>
-              <a:buNone/>
-              <a:tabLst/>
-              <a:defRPr/>
-            </a:pPr>
-            <a:r>
-              <a:rPr kumimoji="0" lang="en-US" sz="1800" b="1" i="0" u="none" strike="noStrike" kern="1200" cap="none" spc="0" normalizeH="0" baseline="0" noProof="0" dirty="0">
-                <a:ln>
-                  <a:noFill/>
-                </a:ln>
-                <a:solidFill>
-                  <a:srgbClr val="FFFF00"/>
-                </a:solidFill>
-                <a:effectLst/>
-                <a:uLnTx/>
-                <a:uFillTx/>
-                <a:latin typeface="Consolas" panose="020B0609020204030204" pitchFamily="49" charset="0"/>
-                <a:ea typeface="+mn-ea"/>
-                <a:cs typeface="+mn-cs"/>
-              </a:rPr>
-              <a:t>HEAD</a:t>
-            </a:r>
-          </a:p>
-        </p:txBody>
-      </p:sp>
-      <p:sp>
-        <p:nvSpPr>
-          <p:cNvPr id="27" name="Down Arrow 26"/>
-          <p:cNvSpPr/>
-          <p:nvPr/>
-        </p:nvSpPr>
-        <p:spPr>
-          <a:xfrm>
-            <a:off x="1081247" y="4706820"/>
+          <a:xfrm rot="16200000">
+            <a:off x="4504798" y="5881052"/>
             <a:ext cx="432048" cy="391906"/>
           </a:xfrm>
           <a:prstGeom prst="downArrow">
@@ -5866,13 +5286,13 @@
       </p:sp>
       <p:sp>
         <p:nvSpPr>
-          <p:cNvPr id="72" name="Down Arrow 71"/>
+          <p:cNvPr id="73" name="Down Arrow 72"/>
           <p:cNvSpPr/>
           <p:nvPr/>
         </p:nvSpPr>
         <p:spPr>
           <a:xfrm rot="16200000">
-            <a:off x="2101411" y="5881052"/>
+            <a:off x="6747490" y="4893149"/>
             <a:ext cx="432048" cy="391906"/>
           </a:xfrm>
           <a:prstGeom prst="downArrow">
@@ -5916,15 +5336,67 @@
           </a:p>
         </p:txBody>
       </p:sp>
+      <p:cxnSp>
+        <p:nvCxnSpPr>
+          <p:cNvPr id="2" name="Straight Connector 1">
+            <a:extLst>
+              <a:ext uri="{FF2B5EF4-FFF2-40B4-BE49-F238E27FC236}">
+                <a16:creationId xmlns:a16="http://schemas.microsoft.com/office/drawing/2014/main" id="{43881905-4A1B-D1E0-5E82-7BE2C32033C8}"/>
+              </a:ext>
+            </a:extLst>
+          </p:cNvPr>
+          <p:cNvCxnSpPr>
+            <a:cxnSpLocks/>
+          </p:cNvCxnSpPr>
+          <p:nvPr/>
+        </p:nvCxnSpPr>
+        <p:spPr>
+          <a:xfrm>
+            <a:off x="2348488" y="4924168"/>
+            <a:ext cx="0" cy="1738784"/>
+          </a:xfrm>
+          <a:prstGeom prst="line">
+            <a:avLst/>
+          </a:prstGeom>
+          <a:ln w="19050">
+            <a:solidFill>
+              <a:schemeClr val="bg1">
+                <a:lumMod val="65000"/>
+              </a:schemeClr>
+            </a:solidFill>
+            <a:prstDash val="sysDash"/>
+          </a:ln>
+        </p:spPr>
+        <p:style>
+          <a:lnRef idx="1">
+            <a:schemeClr val="accent1"/>
+          </a:lnRef>
+          <a:fillRef idx="0">
+            <a:schemeClr val="accent1"/>
+          </a:fillRef>
+          <a:effectRef idx="0">
+            <a:schemeClr val="accent1"/>
+          </a:effectRef>
+          <a:fontRef idx="minor">
+            <a:schemeClr val="tx1"/>
+          </a:fontRef>
+        </p:style>
+      </p:cxnSp>
       <p:sp>
         <p:nvSpPr>
-          <p:cNvPr id="73" name="Down Arrow 72"/>
+          <p:cNvPr id="3" name="Down Arrow 2">
+            <a:extLst>
+              <a:ext uri="{FF2B5EF4-FFF2-40B4-BE49-F238E27FC236}">
+                <a16:creationId xmlns:a16="http://schemas.microsoft.com/office/drawing/2014/main" id="{7E0CE8AD-7DB1-3280-D8AD-693799F1688B}"/>
+              </a:ext>
+            </a:extLst>
+          </p:cNvPr>
           <p:cNvSpPr/>
           <p:nvPr/>
         </p:nvSpPr>
         <p:spPr>
           <a:xfrm rot="16200000">
-            <a:off x="4344103" y="4893149"/>
+            <a:off x="2012969" y="5653285"/>
             <a:ext cx="432048" cy="391906"/>
           </a:xfrm>
           <a:prstGeom prst="downArrow">
@@ -5968,58 +5440,6 @@
           </a:p>
         </p:txBody>
       </p:sp>
-      <p:sp>
-        <p:nvSpPr>
-          <p:cNvPr id="74" name="Down Arrow 73"/>
-          <p:cNvSpPr/>
-          <p:nvPr/>
-        </p:nvSpPr>
-        <p:spPr>
-          <a:xfrm rot="16200000">
-            <a:off x="6557856" y="4868196"/>
-            <a:ext cx="432048" cy="391906"/>
-          </a:xfrm>
-          <a:prstGeom prst="downArrow">
-            <a:avLst/>
-          </a:prstGeom>
-          <a:solidFill>
-            <a:schemeClr val="bg1">
-              <a:lumMod val="85000"/>
-            </a:schemeClr>
-          </a:solidFill>
-          <a:ln>
-            <a:solidFill>
-              <a:schemeClr val="bg1">
-                <a:lumMod val="65000"/>
-              </a:schemeClr>
-            </a:solidFill>
-          </a:ln>
-        </p:spPr>
-        <p:style>
-          <a:lnRef idx="2">
-            <a:schemeClr val="accent1">
-              <a:shade val="50000"/>
-            </a:schemeClr>
-          </a:lnRef>
-          <a:fillRef idx="1">
-            <a:schemeClr val="accent1"/>
-          </a:fillRef>
-          <a:effectRef idx="0">
-            <a:schemeClr val="accent1"/>
-          </a:effectRef>
-          <a:fontRef idx="minor">
-            <a:schemeClr val="lt1"/>
-          </a:fontRef>
-        </p:style>
-        <p:txBody>
-          <a:bodyPr rtlCol="0" anchor="ctr"/>
-          <a:lstStyle/>
-          <a:p>
-            <a:pPr algn="ctr"/>
-            <a:endParaRPr lang="en-US"/>
-          </a:p>
-        </p:txBody>
-      </p:sp>
     </p:spTree>
     <p:extLst>
       <p:ext uri="{BB962C8B-B14F-4D97-AF65-F5344CB8AC3E}">
@@ -6052,10 +5472,10 @@
       </p:grpSpPr>
       <p:grpSp>
         <p:nvGrpSpPr>
-          <p:cNvPr id="4" name="Group 3">
+          <p:cNvPr id="31" name="Group 30">
             <a:extLst>
               <a:ext uri="{FF2B5EF4-FFF2-40B4-BE49-F238E27FC236}">
-                <a16:creationId xmlns:a16="http://schemas.microsoft.com/office/drawing/2014/main" id="{4EA1EE48-2649-8171-B618-5ED193A14CEF}"/>
+                <a16:creationId xmlns:a16="http://schemas.microsoft.com/office/drawing/2014/main" id="{5A548980-03CA-ADEB-BAB8-9483B3173E43}"/>
               </a:ext>
             </a:extLst>
           </p:cNvPr>
@@ -6064,245 +5484,48 @@
         </p:nvGrpSpPr>
         <p:grpSpPr>
           <a:xfrm>
-            <a:off x="125892" y="3224893"/>
-            <a:ext cx="5801395" cy="3287970"/>
-            <a:chOff x="125892" y="3224893"/>
-            <a:chExt cx="5801395" cy="3287970"/>
+            <a:off x="322583" y="3224893"/>
+            <a:ext cx="8440583" cy="3305047"/>
+            <a:chOff x="322583" y="3224893"/>
+            <a:chExt cx="8440583" cy="3305047"/>
           </a:xfrm>
         </p:grpSpPr>
-        <p:sp>
-          <p:nvSpPr>
-            <p:cNvPr id="43" name="Flowchart: Connector 42"/>
-            <p:cNvSpPr/>
-            <p:nvPr/>
-          </p:nvSpPr>
-          <p:spPr>
-            <a:xfrm>
-              <a:off x="132377" y="5039720"/>
-              <a:ext cx="529341" cy="458946"/>
-            </a:xfrm>
-            <a:prstGeom prst="flowChartConnector">
-              <a:avLst/>
-            </a:prstGeom>
-            <a:solidFill>
-              <a:schemeClr val="accent6"/>
-            </a:solidFill>
-            <a:ln>
-              <a:solidFill>
-                <a:schemeClr val="tx1"/>
-              </a:solidFill>
-            </a:ln>
-          </p:spPr>
-          <p:style>
-            <a:lnRef idx="2">
-              <a:schemeClr val="accent3">
-                <a:shade val="50000"/>
-              </a:schemeClr>
-            </a:lnRef>
-            <a:fillRef idx="1">
-              <a:schemeClr val="accent3"/>
-            </a:fillRef>
-            <a:effectRef idx="0">
-              <a:schemeClr val="accent3"/>
-            </a:effectRef>
-            <a:fontRef idx="minor">
-              <a:schemeClr val="lt1"/>
-            </a:fontRef>
-          </p:style>
-          <p:txBody>
-            <a:bodyPr rtlCol="0" anchor="ctr"/>
-            <a:lstStyle/>
-            <a:p>
-              <a:pPr marL="0" marR="0" lvl="0" indent="0" algn="ctr" defTabSz="914400" rtl="0" eaLnBrk="1" fontAlgn="auto" latinLnBrk="0" hangingPunct="1">
-                <a:lnSpc>
-                  <a:spcPct val="100000"/>
-                </a:lnSpc>
-                <a:spcBef>
-                  <a:spcPts val="0"/>
-                </a:spcBef>
-                <a:spcAft>
-                  <a:spcPts val="0"/>
-                </a:spcAft>
-                <a:buClrTx/>
-                <a:buSzTx/>
-                <a:buFontTx/>
-                <a:buNone/>
-                <a:tabLst/>
-                <a:defRPr/>
-              </a:pPr>
-              <a:r>
-                <a:rPr kumimoji="0" lang="en-US" sz="1800" b="0" i="0" u="none" strike="noStrike" kern="1200" cap="none" spc="0" normalizeH="0" baseline="0" noProof="0" dirty="0">
-                  <a:ln>
-                    <a:noFill/>
-                  </a:ln>
-                  <a:solidFill>
-                    <a:prstClr val="white"/>
-                  </a:solidFill>
-                  <a:effectLst/>
-                  <a:uLnTx/>
-                  <a:uFillTx/>
-                  <a:latin typeface="Calibri"/>
-                  <a:ea typeface="+mn-ea"/>
-                  <a:cs typeface="+mn-cs"/>
-                </a:rPr>
-                <a:t>b</a:t>
-              </a:r>
-            </a:p>
-          </p:txBody>
-        </p:sp>
-        <p:sp>
-          <p:nvSpPr>
-            <p:cNvPr id="45" name="Flowchart: Connector 44"/>
-            <p:cNvSpPr/>
-            <p:nvPr/>
-          </p:nvSpPr>
-          <p:spPr>
-            <a:xfrm>
-              <a:off x="125892" y="5780577"/>
-              <a:ext cx="529341" cy="458946"/>
-            </a:xfrm>
-            <a:prstGeom prst="flowChartConnector">
-              <a:avLst/>
-            </a:prstGeom>
-            <a:solidFill>
-              <a:schemeClr val="accent6"/>
-            </a:solidFill>
-            <a:ln>
-              <a:solidFill>
-                <a:schemeClr val="tx1"/>
-              </a:solidFill>
-            </a:ln>
-          </p:spPr>
-          <p:style>
-            <a:lnRef idx="2">
-              <a:schemeClr val="accent3">
-                <a:shade val="50000"/>
-              </a:schemeClr>
-            </a:lnRef>
-            <a:fillRef idx="1">
-              <a:schemeClr val="accent3"/>
-            </a:fillRef>
-            <a:effectRef idx="0">
-              <a:schemeClr val="accent3"/>
-            </a:effectRef>
-            <a:fontRef idx="minor">
-              <a:schemeClr val="lt1"/>
-            </a:fontRef>
-          </p:style>
-          <p:txBody>
-            <a:bodyPr rtlCol="0" anchor="ctr"/>
-            <a:lstStyle/>
-            <a:p>
-              <a:pPr marL="0" marR="0" lvl="0" indent="0" algn="ctr" defTabSz="914400" rtl="0" eaLnBrk="1" fontAlgn="auto" latinLnBrk="0" hangingPunct="1">
-                <a:lnSpc>
-                  <a:spcPct val="100000"/>
-                </a:lnSpc>
-                <a:spcBef>
-                  <a:spcPts val="0"/>
-                </a:spcBef>
-                <a:spcAft>
-                  <a:spcPts val="0"/>
-                </a:spcAft>
-                <a:buClrTx/>
-                <a:buSzTx/>
-                <a:buFontTx/>
-                <a:buNone/>
-                <a:tabLst/>
-                <a:defRPr/>
-              </a:pPr>
-              <a:r>
-                <a:rPr kumimoji="0" lang="en-US" sz="1800" b="0" i="0" u="none" strike="noStrike" kern="1200" cap="none" spc="0" normalizeH="0" baseline="0" noProof="0" dirty="0">
-                  <a:ln>
-                    <a:noFill/>
-                  </a:ln>
-                  <a:solidFill>
-                    <a:prstClr val="white"/>
-                  </a:solidFill>
-                  <a:effectLst/>
-                  <a:uLnTx/>
-                  <a:uFillTx/>
-                  <a:latin typeface="Calibri"/>
-                  <a:ea typeface="+mn-ea"/>
-                  <a:cs typeface="+mn-cs"/>
-                </a:rPr>
-                <a:t>a</a:t>
-              </a:r>
-            </a:p>
-          </p:txBody>
-        </p:sp>
-        <p:cxnSp>
-          <p:nvCxnSpPr>
-            <p:cNvPr id="46" name="Straight Connector 45"/>
-            <p:cNvCxnSpPr>
-              <a:stCxn id="45" idx="0"/>
-              <a:endCxn id="43" idx="4"/>
-            </p:cNvCxnSpPr>
-            <p:nvPr/>
-          </p:nvCxnSpPr>
-          <p:spPr>
-            <a:xfrm flipV="1">
-              <a:off x="390563" y="5498666"/>
-              <a:ext cx="6485" cy="281911"/>
-            </a:xfrm>
-            <a:prstGeom prst="line">
-              <a:avLst/>
-            </a:prstGeom>
-            <a:solidFill>
-              <a:srgbClr val="C00000"/>
-            </a:solidFill>
-            <a:ln>
-              <a:solidFill>
-                <a:schemeClr val="tx1"/>
-              </a:solidFill>
-            </a:ln>
-          </p:spPr>
-          <p:style>
-            <a:lnRef idx="2">
-              <a:schemeClr val="accent3">
-                <a:shade val="50000"/>
-              </a:schemeClr>
-            </a:lnRef>
-            <a:fillRef idx="1">
-              <a:schemeClr val="accent3"/>
-            </a:fillRef>
-            <a:effectRef idx="0">
-              <a:schemeClr val="accent3"/>
-            </a:effectRef>
-            <a:fontRef idx="minor">
-              <a:schemeClr val="lt1"/>
-            </a:fontRef>
-          </p:style>
-        </p:cxnSp>
         <p:grpSp>
           <p:nvGrpSpPr>
-            <p:cNvPr id="47" name="branch: commit 3"/>
+            <p:cNvPr id="4" name="Group 3">
+              <a:extLst>
+                <a:ext uri="{FF2B5EF4-FFF2-40B4-BE49-F238E27FC236}">
+                  <a16:creationId xmlns:a16="http://schemas.microsoft.com/office/drawing/2014/main" id="{4EA1EE48-2649-8171-B618-5ED193A14CEF}"/>
+                </a:ext>
+              </a:extLst>
+            </p:cNvPr>
             <p:cNvGrpSpPr/>
             <p:nvPr/>
           </p:nvGrpSpPr>
           <p:grpSpPr>
             <a:xfrm>
-              <a:off x="584198" y="4365104"/>
-              <a:ext cx="1023933" cy="741827"/>
-              <a:chOff x="2801398" y="4177959"/>
-              <a:chExt cx="1023933" cy="741827"/>
+              <a:off x="2462965" y="3224893"/>
+              <a:ext cx="6300201" cy="3305047"/>
+              <a:chOff x="-372914" y="3224893"/>
+              <a:chExt cx="6300201" cy="3305047"/>
             </a:xfrm>
           </p:grpSpPr>
           <p:sp>
             <p:nvSpPr>
-              <p:cNvPr id="67" name="Flowchart: Connector 66"/>
+              <p:cNvPr id="43" name="Flowchart: Connector 42"/>
               <p:cNvSpPr/>
               <p:nvPr/>
             </p:nvSpPr>
             <p:spPr>
               <a:xfrm>
-                <a:off x="3295990" y="4177959"/>
+                <a:off x="132377" y="5039720"/>
                 <a:ext cx="529341" cy="458946"/>
               </a:xfrm>
               <a:prstGeom prst="flowChartConnector">
                 <a:avLst/>
               </a:prstGeom>
               <a:solidFill>
-                <a:srgbClr val="0070C0"/>
+                <a:schemeClr val="accent6"/>
               </a:solidFill>
               <a:ln>
                 <a:solidFill>
@@ -6362,739 +5585,27 @@
                     <a:ea typeface="+mn-ea"/>
                     <a:cs typeface="+mn-cs"/>
                   </a:rPr>
-                  <a:t>c</a:t>
+                  <a:t>b</a:t>
                 </a:r>
               </a:p>
             </p:txBody>
           </p:sp>
-          <p:cxnSp>
-            <p:nvCxnSpPr>
-              <p:cNvPr id="68" name="Straight Connector 67"/>
-              <p:cNvCxnSpPr>
-                <a:stCxn id="43" idx="7"/>
-                <a:endCxn id="67" idx="3"/>
-              </p:cNvCxnSpPr>
-              <p:nvPr/>
-            </p:nvCxnSpPr>
-            <p:spPr>
-              <a:xfrm flipV="1">
-                <a:off x="2801398" y="4569694"/>
-                <a:ext cx="572112" cy="350092"/>
-              </a:xfrm>
-              <a:prstGeom prst="line">
-                <a:avLst/>
-              </a:prstGeom>
-              <a:ln>
-                <a:solidFill>
-                  <a:schemeClr val="tx1"/>
-                </a:solidFill>
-              </a:ln>
-            </p:spPr>
-            <p:style>
-              <a:lnRef idx="2">
-                <a:schemeClr val="accent3">
-                  <a:shade val="50000"/>
-                </a:schemeClr>
-              </a:lnRef>
-              <a:fillRef idx="1">
-                <a:schemeClr val="accent3"/>
-              </a:fillRef>
-              <a:effectRef idx="0">
-                <a:schemeClr val="accent3"/>
-              </a:effectRef>
-              <a:fontRef idx="minor">
-                <a:schemeClr val="lt1"/>
-              </a:fontRef>
-            </p:style>
-          </p:cxnSp>
-        </p:grpSp>
-        <p:sp>
-          <p:nvSpPr>
-            <p:cNvPr id="54" name="InSlideAnimateShapef6670a49-3898-4e8c-8403-b30b80627c4a"/>
-            <p:cNvSpPr txBox="1">
-              <a:spLocks/>
-            </p:cNvSpPr>
-            <p:nvPr/>
-          </p:nvSpPr>
-          <p:spPr>
-            <a:xfrm flipH="1">
-              <a:off x="1672881" y="4383402"/>
-              <a:ext cx="607226" cy="369332"/>
-            </a:xfrm>
-            <a:prstGeom prst="rightArrow">
-              <a:avLst>
-                <a:gd name="adj1" fmla="val 100000"/>
-                <a:gd name="adj2" fmla="val 22939"/>
-              </a:avLst>
-            </a:prstGeom>
-            <a:solidFill>
-              <a:schemeClr val="tx1"/>
-            </a:solidFill>
-            <a:ln>
-              <a:solidFill>
-                <a:schemeClr val="tx1"/>
-              </a:solidFill>
-            </a:ln>
-          </p:spPr>
-          <p:txBody>
-            <a:bodyPr wrap="square" lIns="0" rIns="0" rtlCol="0">
-              <a:spAutoFit/>
-            </a:bodyPr>
-            <a:lstStyle/>
-            <a:p>
-              <a:pPr marL="0" marR="0" lvl="0" indent="0" algn="l" defTabSz="914400" rtl="0" eaLnBrk="1" fontAlgn="auto" latinLnBrk="0" hangingPunct="1">
-                <a:lnSpc>
-                  <a:spcPct val="100000"/>
-                </a:lnSpc>
-                <a:spcBef>
-                  <a:spcPts val="0"/>
-                </a:spcBef>
-                <a:spcAft>
-                  <a:spcPts val="0"/>
-                </a:spcAft>
-                <a:buClrTx/>
-                <a:buSzTx/>
-                <a:buFontTx/>
-                <a:buNone/>
-                <a:tabLst/>
-                <a:defRPr/>
-              </a:pPr>
-              <a:r>
-                <a:rPr kumimoji="0" lang="en-US" sz="1800" b="0" i="0" u="none" strike="noStrike" kern="1200" cap="none" spc="0" normalizeH="0" baseline="0" noProof="0" dirty="0">
-                  <a:ln>
-                    <a:noFill/>
-                  </a:ln>
-                  <a:solidFill>
-                    <a:srgbClr val="00B0F0"/>
-                  </a:solidFill>
-                  <a:effectLst/>
-                  <a:uLnTx/>
-                  <a:uFillTx/>
-                  <a:latin typeface="Consolas" panose="020B0609020204030204" pitchFamily="49" charset="0"/>
-                  <a:ea typeface="+mn-ea"/>
-                  <a:cs typeface="+mn-cs"/>
-                </a:rPr>
-                <a:t>fix1</a:t>
-              </a:r>
-            </a:p>
-          </p:txBody>
-        </p:sp>
-        <p:sp>
-          <p:nvSpPr>
-            <p:cNvPr id="58" name="InSlideAnimateShape35e178af-dc40-47a5-bc21-4d0e6ab13a0b"/>
-            <p:cNvSpPr txBox="1"/>
-            <p:nvPr/>
-          </p:nvSpPr>
-          <p:spPr>
-            <a:xfrm flipH="1">
-              <a:off x="763719" y="3820398"/>
-              <a:ext cx="850689" cy="369332"/>
-            </a:xfrm>
-            <a:prstGeom prst="rightArrow">
-              <a:avLst>
-                <a:gd name="adj1" fmla="val 100000"/>
-                <a:gd name="adj2" fmla="val 22939"/>
-              </a:avLst>
-            </a:prstGeom>
-            <a:solidFill>
-              <a:schemeClr val="tx1"/>
-            </a:solidFill>
-            <a:ln>
-              <a:solidFill>
-                <a:schemeClr val="tx1"/>
-              </a:solidFill>
-            </a:ln>
-          </p:spPr>
-          <p:txBody>
-            <a:bodyPr wrap="square" lIns="0" rIns="0" rtlCol="0">
-              <a:spAutoFit/>
-            </a:bodyPr>
-            <a:lstStyle/>
-            <a:p>
-              <a:pPr marL="0" marR="0" lvl="0" indent="0" algn="l" defTabSz="914400" rtl="0" eaLnBrk="1" fontAlgn="auto" latinLnBrk="0" hangingPunct="1">
-                <a:lnSpc>
-                  <a:spcPct val="100000"/>
-                </a:lnSpc>
-                <a:spcBef>
-                  <a:spcPts val="0"/>
-                </a:spcBef>
-                <a:spcAft>
-                  <a:spcPts val="0"/>
-                </a:spcAft>
-                <a:buClrTx/>
-                <a:buSzTx/>
-                <a:buFontTx/>
-                <a:buNone/>
-                <a:tabLst/>
-                <a:defRPr/>
-              </a:pPr>
-              <a:r>
-                <a:rPr kumimoji="0" lang="en-US" sz="1800" b="0" i="0" u="none" strike="noStrike" kern="1200" cap="none" spc="0" normalizeH="0" baseline="0" noProof="0" dirty="0">
-                  <a:ln>
-                    <a:noFill/>
-                  </a:ln>
-                  <a:solidFill>
-                    <a:srgbClr val="F79646">
-                      <a:lumMod val="60000"/>
-                      <a:lumOff val="40000"/>
-                    </a:srgbClr>
-                  </a:solidFill>
-                  <a:effectLst/>
-                  <a:uLnTx/>
-                  <a:uFillTx/>
-                  <a:latin typeface="Consolas" panose="020B0609020204030204" pitchFamily="49" charset="0"/>
-                  <a:ea typeface="+mn-ea"/>
-                  <a:cs typeface="+mn-cs"/>
-                </a:rPr>
-                <a:t>master</a:t>
-              </a:r>
-            </a:p>
-          </p:txBody>
-        </p:sp>
-        <p:sp>
-          <p:nvSpPr>
-            <p:cNvPr id="59" name="InSlideAnimateShapec6668a60-df72-441d-a462-fbf247f668dd"/>
-            <p:cNvSpPr txBox="1"/>
-            <p:nvPr/>
-          </p:nvSpPr>
-          <p:spPr>
-            <a:xfrm>
-              <a:off x="1667489" y="3820398"/>
-              <a:ext cx="618009" cy="375073"/>
-            </a:xfrm>
-            <a:prstGeom prst="roundRect">
-              <a:avLst/>
-            </a:prstGeom>
-            <a:solidFill>
-              <a:schemeClr val="tx1"/>
-            </a:solidFill>
-            <a:ln>
-              <a:solidFill>
-                <a:schemeClr val="tx1"/>
-              </a:solidFill>
-            </a:ln>
-          </p:spPr>
-          <p:txBody>
-            <a:bodyPr wrap="square" lIns="0" tIns="0" rIns="0" bIns="0" rtlCol="0" anchor="ctr">
-              <a:noAutofit/>
-            </a:bodyPr>
-            <a:lstStyle/>
-            <a:p>
-              <a:pPr marL="0" marR="0" lvl="0" indent="0" algn="ctr" defTabSz="914400" rtl="0" eaLnBrk="1" fontAlgn="auto" latinLnBrk="0" hangingPunct="1">
-                <a:lnSpc>
-                  <a:spcPct val="100000"/>
-                </a:lnSpc>
-                <a:spcBef>
-                  <a:spcPts val="0"/>
-                </a:spcBef>
-                <a:spcAft>
-                  <a:spcPts val="0"/>
-                </a:spcAft>
-                <a:buClrTx/>
-                <a:buSzTx/>
-                <a:buFontTx/>
-                <a:buNone/>
-                <a:tabLst/>
-                <a:defRPr/>
-              </a:pPr>
-              <a:r>
-                <a:rPr kumimoji="0" lang="en-US" sz="1800" b="1" i="0" u="none" strike="noStrike" kern="1200" cap="none" spc="0" normalizeH="0" baseline="0" noProof="0" dirty="0">
-                  <a:ln>
-                    <a:noFill/>
-                  </a:ln>
-                  <a:solidFill>
-                    <a:srgbClr val="FFFF00"/>
-                  </a:solidFill>
-                  <a:effectLst/>
-                  <a:uLnTx/>
-                  <a:uFillTx/>
-                  <a:latin typeface="Consolas" panose="020B0609020204030204" pitchFamily="49" charset="0"/>
-                  <a:ea typeface="+mn-ea"/>
-                  <a:cs typeface="+mn-cs"/>
-                </a:rPr>
-                <a:t>HEAD</a:t>
-              </a:r>
-            </a:p>
-          </p:txBody>
-        </p:sp>
-        <p:cxnSp>
-          <p:nvCxnSpPr>
-            <p:cNvPr id="60" name="Straight Connector 59"/>
-            <p:cNvCxnSpPr>
-              <a:cxnSpLocks/>
-            </p:cNvCxnSpPr>
-            <p:nvPr/>
-          </p:nvCxnSpPr>
-          <p:spPr>
-            <a:xfrm>
-              <a:off x="2411760" y="3224893"/>
-              <a:ext cx="0" cy="3287970"/>
-            </a:xfrm>
-            <a:prstGeom prst="line">
-              <a:avLst/>
-            </a:prstGeom>
-            <a:ln w="19050">
-              <a:solidFill>
-                <a:schemeClr val="bg1">
-                  <a:lumMod val="65000"/>
-                </a:schemeClr>
-              </a:solidFill>
-              <a:prstDash val="sysDash"/>
-            </a:ln>
-          </p:spPr>
-          <p:style>
-            <a:lnRef idx="1">
-              <a:schemeClr val="accent1"/>
-            </a:lnRef>
-            <a:fillRef idx="0">
-              <a:schemeClr val="accent1"/>
-            </a:fillRef>
-            <a:effectRef idx="0">
-              <a:schemeClr val="accent1"/>
-            </a:effectRef>
-            <a:fontRef idx="minor">
-              <a:schemeClr val="tx1"/>
-            </a:fontRef>
-          </p:style>
-        </p:cxnSp>
-        <p:sp>
-          <p:nvSpPr>
-            <p:cNvPr id="69" name="Flowchart: Connector 68"/>
-            <p:cNvSpPr/>
-            <p:nvPr/>
-          </p:nvSpPr>
-          <p:spPr>
-            <a:xfrm>
-              <a:off x="142143" y="3859669"/>
-              <a:ext cx="529341" cy="458946"/>
-            </a:xfrm>
-            <a:prstGeom prst="flowChartConnector">
-              <a:avLst/>
-            </a:prstGeom>
-            <a:solidFill>
-              <a:schemeClr val="accent6"/>
-            </a:solidFill>
-            <a:ln>
-              <a:solidFill>
-                <a:schemeClr val="tx1"/>
-              </a:solidFill>
-            </a:ln>
-          </p:spPr>
-          <p:style>
-            <a:lnRef idx="2">
-              <a:schemeClr val="accent3">
-                <a:shade val="50000"/>
-              </a:schemeClr>
-            </a:lnRef>
-            <a:fillRef idx="1">
-              <a:schemeClr val="accent3"/>
-            </a:fillRef>
-            <a:effectRef idx="0">
-              <a:schemeClr val="accent3"/>
-            </a:effectRef>
-            <a:fontRef idx="minor">
-              <a:schemeClr val="lt1"/>
-            </a:fontRef>
-          </p:style>
-          <p:txBody>
-            <a:bodyPr rtlCol="0" anchor="ctr"/>
-            <a:lstStyle/>
-            <a:p>
-              <a:pPr marL="0" marR="0" lvl="0" indent="0" algn="ctr" defTabSz="914400" rtl="0" eaLnBrk="1" fontAlgn="auto" latinLnBrk="0" hangingPunct="1">
-                <a:lnSpc>
-                  <a:spcPct val="100000"/>
-                </a:lnSpc>
-                <a:spcBef>
-                  <a:spcPts val="0"/>
-                </a:spcBef>
-                <a:spcAft>
-                  <a:spcPts val="0"/>
-                </a:spcAft>
-                <a:buClrTx/>
-                <a:buSzTx/>
-                <a:buFontTx/>
-                <a:buNone/>
-                <a:tabLst/>
-                <a:defRPr/>
-              </a:pPr>
-              <a:r>
-                <a:rPr kumimoji="0" lang="en-US" sz="1800" b="0" i="0" u="none" strike="noStrike" kern="1200" cap="none" spc="0" normalizeH="0" baseline="0" noProof="0" dirty="0">
-                  <a:ln>
-                    <a:noFill/>
-                  </a:ln>
-                  <a:solidFill>
-                    <a:prstClr val="white"/>
-                  </a:solidFill>
-                  <a:effectLst/>
-                  <a:uLnTx/>
-                  <a:uFillTx/>
-                  <a:latin typeface="Calibri"/>
-                  <a:ea typeface="+mn-ea"/>
-                  <a:cs typeface="+mn-cs"/>
-                </a:rPr>
-                <a:t>d</a:t>
-              </a:r>
-            </a:p>
-          </p:txBody>
-        </p:sp>
-        <p:cxnSp>
-          <p:nvCxnSpPr>
-            <p:cNvPr id="73" name="Straight Connector 72"/>
-            <p:cNvCxnSpPr>
-              <a:stCxn id="43" idx="0"/>
-              <a:endCxn id="69" idx="4"/>
-            </p:cNvCxnSpPr>
-            <p:nvPr/>
-          </p:nvCxnSpPr>
-          <p:spPr>
-            <a:xfrm flipV="1">
-              <a:off x="397048" y="4318615"/>
-              <a:ext cx="9766" cy="721105"/>
-            </a:xfrm>
-            <a:prstGeom prst="line">
-              <a:avLst/>
-            </a:prstGeom>
-            <a:solidFill>
-              <a:srgbClr val="C00000"/>
-            </a:solidFill>
-            <a:ln>
-              <a:solidFill>
-                <a:schemeClr val="tx1"/>
-              </a:solidFill>
-            </a:ln>
-          </p:spPr>
-          <p:style>
-            <a:lnRef idx="2">
-              <a:schemeClr val="accent3">
-                <a:shade val="50000"/>
-              </a:schemeClr>
-            </a:lnRef>
-            <a:fillRef idx="1">
-              <a:schemeClr val="accent3"/>
-            </a:fillRef>
-            <a:effectRef idx="0">
-              <a:schemeClr val="accent3"/>
-            </a:effectRef>
-            <a:fontRef idx="minor">
-              <a:schemeClr val="lt1"/>
-            </a:fontRef>
-          </p:style>
-        </p:cxnSp>
-        <p:sp>
-          <p:nvSpPr>
-            <p:cNvPr id="109" name="Down Arrow 71"/>
-            <p:cNvSpPr/>
-            <p:nvPr/>
-          </p:nvSpPr>
-          <p:spPr>
-            <a:xfrm rot="16200000">
-              <a:off x="2092964" y="5443668"/>
-              <a:ext cx="432048" cy="391906"/>
-            </a:xfrm>
-            <a:prstGeom prst="downArrow">
-              <a:avLst/>
-            </a:prstGeom>
-            <a:solidFill>
-              <a:schemeClr val="bg1">
-                <a:lumMod val="85000"/>
-              </a:schemeClr>
-            </a:solidFill>
-            <a:ln>
-              <a:solidFill>
-                <a:schemeClr val="bg1">
-                  <a:lumMod val="65000"/>
-                </a:schemeClr>
-              </a:solidFill>
-            </a:ln>
-          </p:spPr>
-          <p:style>
-            <a:lnRef idx="2">
-              <a:schemeClr val="accent1">
-                <a:shade val="50000"/>
-              </a:schemeClr>
-            </a:lnRef>
-            <a:fillRef idx="1">
-              <a:schemeClr val="accent1"/>
-            </a:fillRef>
-            <a:effectRef idx="0">
-              <a:schemeClr val="accent1"/>
-            </a:effectRef>
-            <a:fontRef idx="minor">
-              <a:schemeClr val="lt1"/>
-            </a:fontRef>
-          </p:style>
-          <p:txBody>
-            <a:bodyPr rtlCol="0" anchor="ctr"/>
-            <a:lstStyle/>
-            <a:p>
-              <a:pPr algn="ctr"/>
-              <a:endParaRPr lang="en-US"/>
-            </a:p>
-          </p:txBody>
-        </p:sp>
-        <p:sp>
-          <p:nvSpPr>
-            <p:cNvPr id="7" name="Flowchart: Connector 73">
-              <a:extLst>
-                <a:ext uri="{FF2B5EF4-FFF2-40B4-BE49-F238E27FC236}">
-                  <a16:creationId xmlns:a16="http://schemas.microsoft.com/office/drawing/2014/main" id="{62DB80E4-3140-D73F-B207-C86A74256913}"/>
-                </a:ext>
-              </a:extLst>
-            </p:cNvPr>
-            <p:cNvSpPr/>
-            <p:nvPr/>
-          </p:nvSpPr>
-          <p:spPr>
-            <a:xfrm>
-              <a:off x="2665801" y="5032363"/>
-              <a:ext cx="529341" cy="458946"/>
-            </a:xfrm>
-            <a:prstGeom prst="flowChartConnector">
-              <a:avLst/>
-            </a:prstGeom>
-            <a:solidFill>
-              <a:schemeClr val="accent6"/>
-            </a:solidFill>
-            <a:ln>
-              <a:solidFill>
-                <a:schemeClr val="tx1"/>
-              </a:solidFill>
-            </a:ln>
-          </p:spPr>
-          <p:style>
-            <a:lnRef idx="2">
-              <a:schemeClr val="accent3">
-                <a:shade val="50000"/>
-              </a:schemeClr>
-            </a:lnRef>
-            <a:fillRef idx="1">
-              <a:schemeClr val="accent3"/>
-            </a:fillRef>
-            <a:effectRef idx="0">
-              <a:schemeClr val="accent3"/>
-            </a:effectRef>
-            <a:fontRef idx="minor">
-              <a:schemeClr val="lt1"/>
-            </a:fontRef>
-          </p:style>
-          <p:txBody>
-            <a:bodyPr rtlCol="0" anchor="ctr"/>
-            <a:lstStyle/>
-            <a:p>
-              <a:pPr marL="0" marR="0" lvl="0" indent="0" algn="ctr" defTabSz="914400" rtl="0" eaLnBrk="1" fontAlgn="auto" latinLnBrk="0" hangingPunct="1">
-                <a:lnSpc>
-                  <a:spcPct val="100000"/>
-                </a:lnSpc>
-                <a:spcBef>
-                  <a:spcPts val="0"/>
-                </a:spcBef>
-                <a:spcAft>
-                  <a:spcPts val="0"/>
-                </a:spcAft>
-                <a:buClrTx/>
-                <a:buSzTx/>
-                <a:buFontTx/>
-                <a:buNone/>
-                <a:tabLst/>
-                <a:defRPr/>
-              </a:pPr>
-              <a:r>
-                <a:rPr kumimoji="0" lang="en-US" sz="1800" b="0" i="0" u="none" strike="noStrike" kern="1200" cap="none" spc="0" normalizeH="0" baseline="0" noProof="0" dirty="0">
-                  <a:ln>
-                    <a:noFill/>
-                  </a:ln>
-                  <a:solidFill>
-                    <a:prstClr val="white"/>
-                  </a:solidFill>
-                  <a:effectLst/>
-                  <a:uLnTx/>
-                  <a:uFillTx/>
-                  <a:latin typeface="Calibri"/>
-                  <a:ea typeface="+mn-ea"/>
-                  <a:cs typeface="+mn-cs"/>
-                </a:rPr>
-                <a:t>b</a:t>
-              </a:r>
-            </a:p>
-          </p:txBody>
-        </p:sp>
-        <p:sp>
-          <p:nvSpPr>
-            <p:cNvPr id="8" name="Flowchart: Connector 74">
-              <a:extLst>
-                <a:ext uri="{FF2B5EF4-FFF2-40B4-BE49-F238E27FC236}">
-                  <a16:creationId xmlns:a16="http://schemas.microsoft.com/office/drawing/2014/main" id="{2FED90CE-265F-05ED-B6E9-2571BC852C51}"/>
-                </a:ext>
-              </a:extLst>
-            </p:cNvPr>
-            <p:cNvSpPr/>
-            <p:nvPr/>
-          </p:nvSpPr>
-          <p:spPr>
-            <a:xfrm>
-              <a:off x="2659316" y="5773220"/>
-              <a:ext cx="529341" cy="458946"/>
-            </a:xfrm>
-            <a:prstGeom prst="flowChartConnector">
-              <a:avLst/>
-            </a:prstGeom>
-            <a:solidFill>
-              <a:schemeClr val="accent6"/>
-            </a:solidFill>
-            <a:ln>
-              <a:solidFill>
-                <a:schemeClr val="tx1"/>
-              </a:solidFill>
-            </a:ln>
-          </p:spPr>
-          <p:style>
-            <a:lnRef idx="2">
-              <a:schemeClr val="accent3">
-                <a:shade val="50000"/>
-              </a:schemeClr>
-            </a:lnRef>
-            <a:fillRef idx="1">
-              <a:schemeClr val="accent3"/>
-            </a:fillRef>
-            <a:effectRef idx="0">
-              <a:schemeClr val="accent3"/>
-            </a:effectRef>
-            <a:fontRef idx="minor">
-              <a:schemeClr val="lt1"/>
-            </a:fontRef>
-          </p:style>
-          <p:txBody>
-            <a:bodyPr rtlCol="0" anchor="ctr"/>
-            <a:lstStyle/>
-            <a:p>
-              <a:pPr marL="0" marR="0" lvl="0" indent="0" algn="ctr" defTabSz="914400" rtl="0" eaLnBrk="1" fontAlgn="auto" latinLnBrk="0" hangingPunct="1">
-                <a:lnSpc>
-                  <a:spcPct val="100000"/>
-                </a:lnSpc>
-                <a:spcBef>
-                  <a:spcPts val="0"/>
-                </a:spcBef>
-                <a:spcAft>
-                  <a:spcPts val="0"/>
-                </a:spcAft>
-                <a:buClrTx/>
-                <a:buSzTx/>
-                <a:buFontTx/>
-                <a:buNone/>
-                <a:tabLst/>
-                <a:defRPr/>
-              </a:pPr>
-              <a:r>
-                <a:rPr kumimoji="0" lang="en-US" sz="1800" b="0" i="0" u="none" strike="noStrike" kern="1200" cap="none" spc="0" normalizeH="0" baseline="0" noProof="0" dirty="0">
-                  <a:ln>
-                    <a:noFill/>
-                  </a:ln>
-                  <a:solidFill>
-                    <a:prstClr val="white"/>
-                  </a:solidFill>
-                  <a:effectLst/>
-                  <a:uLnTx/>
-                  <a:uFillTx/>
-                  <a:latin typeface="Calibri"/>
-                  <a:ea typeface="+mn-ea"/>
-                  <a:cs typeface="+mn-cs"/>
-                </a:rPr>
-                <a:t>a</a:t>
-              </a:r>
-            </a:p>
-          </p:txBody>
-        </p:sp>
-        <p:cxnSp>
-          <p:nvCxnSpPr>
-            <p:cNvPr id="9" name="Straight Connector 8">
-              <a:extLst>
-                <a:ext uri="{FF2B5EF4-FFF2-40B4-BE49-F238E27FC236}">
-                  <a16:creationId xmlns:a16="http://schemas.microsoft.com/office/drawing/2014/main" id="{6628CA7E-C6D5-869E-754B-F2A346A44734}"/>
-                </a:ext>
-              </a:extLst>
-            </p:cNvPr>
-            <p:cNvCxnSpPr>
-              <a:stCxn id="8" idx="0"/>
-              <a:endCxn id="7" idx="4"/>
-            </p:cNvCxnSpPr>
-            <p:nvPr/>
-          </p:nvCxnSpPr>
-          <p:spPr>
-            <a:xfrm flipV="1">
-              <a:off x="2923987" y="5491309"/>
-              <a:ext cx="6485" cy="281911"/>
-            </a:xfrm>
-            <a:prstGeom prst="line">
-              <a:avLst/>
-            </a:prstGeom>
-            <a:solidFill>
-              <a:srgbClr val="C00000"/>
-            </a:solidFill>
-            <a:ln>
-              <a:solidFill>
-                <a:schemeClr val="tx1"/>
-              </a:solidFill>
-            </a:ln>
-          </p:spPr>
-          <p:style>
-            <a:lnRef idx="2">
-              <a:schemeClr val="accent3">
-                <a:shade val="50000"/>
-              </a:schemeClr>
-            </a:lnRef>
-            <a:fillRef idx="1">
-              <a:schemeClr val="accent3"/>
-            </a:fillRef>
-            <a:effectRef idx="0">
-              <a:schemeClr val="accent3"/>
-            </a:effectRef>
-            <a:fontRef idx="minor">
-              <a:schemeClr val="lt1"/>
-            </a:fontRef>
-          </p:style>
-        </p:cxnSp>
-        <p:grpSp>
-          <p:nvGrpSpPr>
-            <p:cNvPr id="10" name="branch: commit 3">
-              <a:extLst>
-                <a:ext uri="{FF2B5EF4-FFF2-40B4-BE49-F238E27FC236}">
-                  <a16:creationId xmlns:a16="http://schemas.microsoft.com/office/drawing/2014/main" id="{4F939BFE-249C-D829-3AC9-506ED44D2F5B}"/>
-                </a:ext>
-              </a:extLst>
-            </p:cNvPr>
-            <p:cNvGrpSpPr/>
-            <p:nvPr/>
-          </p:nvGrpSpPr>
-          <p:grpSpPr>
-            <a:xfrm>
-              <a:off x="3195142" y="4433266"/>
-              <a:ext cx="1420813" cy="828570"/>
-              <a:chOff x="2404518" y="4177959"/>
-              <a:chExt cx="1420813" cy="828570"/>
-            </a:xfrm>
-          </p:grpSpPr>
           <p:sp>
             <p:nvSpPr>
-              <p:cNvPr id="11" name="Flowchart: Connector 79">
-                <a:extLst>
-                  <a:ext uri="{FF2B5EF4-FFF2-40B4-BE49-F238E27FC236}">
-                    <a16:creationId xmlns:a16="http://schemas.microsoft.com/office/drawing/2014/main" id="{238D36CE-9E50-FBA4-2FC1-5B1B168309E8}"/>
-                  </a:ext>
-                </a:extLst>
-              </p:cNvPr>
+              <p:cNvPr id="45" name="Flowchart: Connector 44"/>
               <p:cNvSpPr/>
               <p:nvPr/>
             </p:nvSpPr>
             <p:spPr>
               <a:xfrm>
-                <a:off x="3295990" y="4177959"/>
+                <a:off x="125892" y="5780577"/>
                 <a:ext cx="529341" cy="458946"/>
               </a:xfrm>
               <a:prstGeom prst="flowChartConnector">
                 <a:avLst/>
               </a:prstGeom>
               <a:solidFill>
-                <a:srgbClr val="0070C0"/>
+                <a:schemeClr val="accent6"/>
               </a:solidFill>
               <a:ln>
                 <a:solidFill>
@@ -7154,35 +5665,31 @@
                     <a:ea typeface="+mn-ea"/>
                     <a:cs typeface="+mn-cs"/>
                   </a:rPr>
-                  <a:t>c</a:t>
+                  <a:t>a</a:t>
                 </a:r>
               </a:p>
             </p:txBody>
           </p:sp>
           <p:cxnSp>
             <p:nvCxnSpPr>
-              <p:cNvPr id="12" name="Straight Connector 11">
-                <a:extLst>
-                  <a:ext uri="{FF2B5EF4-FFF2-40B4-BE49-F238E27FC236}">
-                    <a16:creationId xmlns:a16="http://schemas.microsoft.com/office/drawing/2014/main" id="{6E21980D-460C-F9F0-ABE1-69B042307DEF}"/>
-                  </a:ext>
-                </a:extLst>
-              </p:cNvPr>
+              <p:cNvPr id="46" name="Straight Connector 45"/>
               <p:cNvCxnSpPr>
-                <a:cxnSpLocks/>
-                <a:stCxn id="7" idx="6"/>
-                <a:endCxn id="11" idx="3"/>
+                <a:stCxn id="45" idx="0"/>
+                <a:endCxn id="43" idx="4"/>
               </p:cNvCxnSpPr>
               <p:nvPr/>
             </p:nvCxnSpPr>
             <p:spPr>
               <a:xfrm flipV="1">
-                <a:off x="2404518" y="4569694"/>
-                <a:ext cx="968992" cy="436835"/>
+                <a:off x="390563" y="5498666"/>
+                <a:ext cx="6485" cy="281911"/>
               </a:xfrm>
               <a:prstGeom prst="line">
                 <a:avLst/>
               </a:prstGeom>
+              <a:solidFill>
+                <a:srgbClr val="C00000"/>
+              </a:solidFill>
               <a:ln>
                 <a:solidFill>
                   <a:schemeClr val="tx1"/>
@@ -7206,333 +5713,406 @@
               </a:fontRef>
             </p:style>
           </p:cxnSp>
-        </p:grpSp>
-        <p:sp>
-          <p:nvSpPr>
-            <p:cNvPr id="13" name="InSlideAnimateShapef6670a49-3898-4e8c-8403-b30b80627c4a">
-              <a:extLst>
-                <a:ext uri="{FF2B5EF4-FFF2-40B4-BE49-F238E27FC236}">
-                  <a16:creationId xmlns:a16="http://schemas.microsoft.com/office/drawing/2014/main" id="{44038113-90FC-D451-E56A-1499CE153442}"/>
-                </a:ext>
-              </a:extLst>
-            </p:cNvPr>
-            <p:cNvSpPr txBox="1">
-              <a:spLocks/>
-            </p:cNvSpPr>
-            <p:nvPr/>
-          </p:nvSpPr>
-          <p:spPr>
-            <a:xfrm flipH="1">
-              <a:off x="4671930" y="3340094"/>
-              <a:ext cx="607226" cy="369332"/>
-            </a:xfrm>
-            <a:prstGeom prst="rightArrow">
-              <a:avLst>
-                <a:gd name="adj1" fmla="val 100000"/>
-                <a:gd name="adj2" fmla="val 22939"/>
-              </a:avLst>
-            </a:prstGeom>
-            <a:solidFill>
-              <a:schemeClr val="tx1"/>
-            </a:solidFill>
-            <a:ln>
+          <p:grpSp>
+            <p:nvGrpSpPr>
+              <p:cNvPr id="47" name="branch: commit 3"/>
+              <p:cNvGrpSpPr/>
+              <p:nvPr/>
+            </p:nvGrpSpPr>
+            <p:grpSpPr>
+              <a:xfrm>
+                <a:off x="584198" y="4365104"/>
+                <a:ext cx="1023933" cy="741827"/>
+                <a:chOff x="2801398" y="4177959"/>
+                <a:chExt cx="1023933" cy="741827"/>
+              </a:xfrm>
+            </p:grpSpPr>
+            <p:sp>
+              <p:nvSpPr>
+                <p:cNvPr id="67" name="Flowchart: Connector 66"/>
+                <p:cNvSpPr/>
+                <p:nvPr/>
+              </p:nvSpPr>
+              <p:spPr>
+                <a:xfrm>
+                  <a:off x="3295990" y="4177959"/>
+                  <a:ext cx="529341" cy="458946"/>
+                </a:xfrm>
+                <a:prstGeom prst="flowChartConnector">
+                  <a:avLst/>
+                </a:prstGeom>
+                <a:solidFill>
+                  <a:srgbClr val="0070C0"/>
+                </a:solidFill>
+                <a:ln>
+                  <a:solidFill>
+                    <a:schemeClr val="tx1"/>
+                  </a:solidFill>
+                </a:ln>
+              </p:spPr>
+              <p:style>
+                <a:lnRef idx="2">
+                  <a:schemeClr val="accent3">
+                    <a:shade val="50000"/>
+                  </a:schemeClr>
+                </a:lnRef>
+                <a:fillRef idx="1">
+                  <a:schemeClr val="accent3"/>
+                </a:fillRef>
+                <a:effectRef idx="0">
+                  <a:schemeClr val="accent3"/>
+                </a:effectRef>
+                <a:fontRef idx="minor">
+                  <a:schemeClr val="lt1"/>
+                </a:fontRef>
+              </p:style>
+              <p:txBody>
+                <a:bodyPr rtlCol="0" anchor="ctr"/>
+                <a:lstStyle/>
+                <a:p>
+                  <a:pPr marL="0" marR="0" lvl="0" indent="0" algn="ctr" defTabSz="914400" rtl="0" eaLnBrk="1" fontAlgn="auto" latinLnBrk="0" hangingPunct="1">
+                    <a:lnSpc>
+                      <a:spcPct val="100000"/>
+                    </a:lnSpc>
+                    <a:spcBef>
+                      <a:spcPts val="0"/>
+                    </a:spcBef>
+                    <a:spcAft>
+                      <a:spcPts val="0"/>
+                    </a:spcAft>
+                    <a:buClrTx/>
+                    <a:buSzTx/>
+                    <a:buFontTx/>
+                    <a:buNone/>
+                    <a:tabLst/>
+                    <a:defRPr/>
+                  </a:pPr>
+                  <a:r>
+                    <a:rPr kumimoji="0" lang="en-US" sz="1800" b="0" i="0" u="none" strike="noStrike" kern="1200" cap="none" spc="0" normalizeH="0" baseline="0" noProof="0" dirty="0">
+                      <a:ln>
+                        <a:noFill/>
+                      </a:ln>
+                      <a:solidFill>
+                        <a:prstClr val="white"/>
+                      </a:solidFill>
+                      <a:effectLst/>
+                      <a:uLnTx/>
+                      <a:uFillTx/>
+                      <a:latin typeface="Calibri"/>
+                      <a:ea typeface="+mn-ea"/>
+                      <a:cs typeface="+mn-cs"/>
+                    </a:rPr>
+                    <a:t>c</a:t>
+                  </a:r>
+                </a:p>
+              </p:txBody>
+            </p:sp>
+            <p:cxnSp>
+              <p:nvCxnSpPr>
+                <p:cNvPr id="68" name="Straight Connector 67"/>
+                <p:cNvCxnSpPr>
+                  <a:stCxn id="43" idx="7"/>
+                  <a:endCxn id="67" idx="3"/>
+                </p:cNvCxnSpPr>
+                <p:nvPr/>
+              </p:nvCxnSpPr>
+              <p:spPr>
+                <a:xfrm flipV="1">
+                  <a:off x="2801398" y="4569694"/>
+                  <a:ext cx="572112" cy="350092"/>
+                </a:xfrm>
+                <a:prstGeom prst="line">
+                  <a:avLst/>
+                </a:prstGeom>
+                <a:ln>
+                  <a:solidFill>
+                    <a:schemeClr val="tx1"/>
+                  </a:solidFill>
+                </a:ln>
+              </p:spPr>
+              <p:style>
+                <a:lnRef idx="2">
+                  <a:schemeClr val="accent3">
+                    <a:shade val="50000"/>
+                  </a:schemeClr>
+                </a:lnRef>
+                <a:fillRef idx="1">
+                  <a:schemeClr val="accent3"/>
+                </a:fillRef>
+                <a:effectRef idx="0">
+                  <a:schemeClr val="accent3"/>
+                </a:effectRef>
+                <a:fontRef idx="minor">
+                  <a:schemeClr val="lt1"/>
+                </a:fontRef>
+              </p:style>
+            </p:cxnSp>
+          </p:grpSp>
+          <p:sp>
+            <p:nvSpPr>
+              <p:cNvPr id="54" name="InSlideAnimateShapef6670a49-3898-4e8c-8403-b30b80627c4a"/>
+              <p:cNvSpPr txBox="1">
+                <a:spLocks/>
+              </p:cNvSpPr>
+              <p:nvPr/>
+            </p:nvSpPr>
+            <p:spPr>
+              <a:xfrm flipH="1">
+                <a:off x="1672881" y="4383402"/>
+                <a:ext cx="607226" cy="369332"/>
+              </a:xfrm>
+              <a:prstGeom prst="rightArrow">
+                <a:avLst>
+                  <a:gd name="adj1" fmla="val 100000"/>
+                  <a:gd name="adj2" fmla="val 22939"/>
+                </a:avLst>
+              </a:prstGeom>
               <a:solidFill>
                 <a:schemeClr val="tx1"/>
               </a:solidFill>
-            </a:ln>
-          </p:spPr>
-          <p:txBody>
-            <a:bodyPr wrap="square" lIns="0" rIns="0" rtlCol="0">
-              <a:spAutoFit/>
-            </a:bodyPr>
-            <a:lstStyle/>
-            <a:p>
-              <a:pPr marL="0" marR="0" lvl="0" indent="0" algn="l" defTabSz="914400" rtl="0" eaLnBrk="1" fontAlgn="auto" latinLnBrk="0" hangingPunct="1">
-                <a:lnSpc>
-                  <a:spcPct val="100000"/>
-                </a:lnSpc>
-                <a:spcBef>
-                  <a:spcPts val="0"/>
-                </a:spcBef>
-                <a:spcAft>
-                  <a:spcPts val="0"/>
-                </a:spcAft>
-                <a:buClrTx/>
-                <a:buSzTx/>
-                <a:buFontTx/>
-                <a:buNone/>
-                <a:tabLst/>
-                <a:defRPr/>
-              </a:pPr>
-              <a:r>
-                <a:rPr kumimoji="0" lang="en-US" sz="1800" b="0" i="0" u="none" strike="noStrike" kern="1200" cap="none" spc="0" normalizeH="0" baseline="0" noProof="0" dirty="0">
-                  <a:ln>
-                    <a:noFill/>
-                  </a:ln>
-                  <a:solidFill>
-                    <a:srgbClr val="00B0F0"/>
-                  </a:solidFill>
-                  <a:effectLst/>
-                  <a:uLnTx/>
-                  <a:uFillTx/>
-                  <a:latin typeface="Consolas" panose="020B0609020204030204" pitchFamily="49" charset="0"/>
-                  <a:ea typeface="+mn-ea"/>
-                  <a:cs typeface="+mn-cs"/>
-                </a:rPr>
-                <a:t>fix1</a:t>
-              </a:r>
-            </a:p>
-          </p:txBody>
-        </p:sp>
-        <p:sp>
-          <p:nvSpPr>
-            <p:cNvPr id="15" name="InSlideAnimateShapec6668a60-df72-441d-a462-fbf247f668dd">
-              <a:extLst>
-                <a:ext uri="{FF2B5EF4-FFF2-40B4-BE49-F238E27FC236}">
-                  <a16:creationId xmlns:a16="http://schemas.microsoft.com/office/drawing/2014/main" id="{6B36A784-7B43-CE19-D204-257D6732722A}"/>
-                </a:ext>
-              </a:extLst>
-            </p:cNvPr>
-            <p:cNvSpPr txBox="1"/>
-            <p:nvPr/>
-          </p:nvSpPr>
-          <p:spPr>
-            <a:xfrm>
-              <a:off x="5309278" y="3334162"/>
-              <a:ext cx="618009" cy="375073"/>
-            </a:xfrm>
-            <a:prstGeom prst="roundRect">
-              <a:avLst/>
-            </a:prstGeom>
-            <a:solidFill>
-              <a:schemeClr val="tx1"/>
-            </a:solidFill>
-            <a:ln>
+              <a:ln>
+                <a:solidFill>
+                  <a:schemeClr val="tx1"/>
+                </a:solidFill>
+              </a:ln>
+            </p:spPr>
+            <p:txBody>
+              <a:bodyPr wrap="square" lIns="0" rIns="0" rtlCol="0">
+                <a:spAutoFit/>
+              </a:bodyPr>
+              <a:lstStyle/>
+              <a:p>
+                <a:pPr marL="0" marR="0" lvl="0" indent="0" algn="l" defTabSz="914400" rtl="0" eaLnBrk="1" fontAlgn="auto" latinLnBrk="0" hangingPunct="1">
+                  <a:lnSpc>
+                    <a:spcPct val="100000"/>
+                  </a:lnSpc>
+                  <a:spcBef>
+                    <a:spcPts val="0"/>
+                  </a:spcBef>
+                  <a:spcAft>
+                    <a:spcPts val="0"/>
+                  </a:spcAft>
+                  <a:buClrTx/>
+                  <a:buSzTx/>
+                  <a:buFontTx/>
+                  <a:buNone/>
+                  <a:tabLst/>
+                  <a:defRPr/>
+                </a:pPr>
+                <a:r>
+                  <a:rPr kumimoji="0" lang="en-US" sz="1800" b="0" i="0" u="none" strike="noStrike" kern="1200" cap="none" spc="0" normalizeH="0" baseline="0" noProof="0" dirty="0">
+                    <a:ln>
+                      <a:noFill/>
+                    </a:ln>
+                    <a:solidFill>
+                      <a:srgbClr val="00B0F0"/>
+                    </a:solidFill>
+                    <a:effectLst/>
+                    <a:uLnTx/>
+                    <a:uFillTx/>
+                    <a:latin typeface="Consolas" panose="020B0609020204030204" pitchFamily="49" charset="0"/>
+                    <a:ea typeface="+mn-ea"/>
+                    <a:cs typeface="+mn-cs"/>
+                  </a:rPr>
+                  <a:t>fix1</a:t>
+                </a:r>
+              </a:p>
+            </p:txBody>
+          </p:sp>
+          <p:sp>
+            <p:nvSpPr>
+              <p:cNvPr id="58" name="InSlideAnimateShape35e178af-dc40-47a5-bc21-4d0e6ab13a0b"/>
+              <p:cNvSpPr txBox="1"/>
+              <p:nvPr/>
+            </p:nvSpPr>
+            <p:spPr>
+              <a:xfrm flipH="1">
+                <a:off x="763719" y="3820398"/>
+                <a:ext cx="850689" cy="369332"/>
+              </a:xfrm>
+              <a:prstGeom prst="rightArrow">
+                <a:avLst>
+                  <a:gd name="adj1" fmla="val 100000"/>
+                  <a:gd name="adj2" fmla="val 22939"/>
+                </a:avLst>
+              </a:prstGeom>
               <a:solidFill>
                 <a:schemeClr val="tx1"/>
               </a:solidFill>
-            </a:ln>
-          </p:spPr>
-          <p:txBody>
-            <a:bodyPr wrap="square" lIns="0" tIns="0" rIns="0" bIns="0" rtlCol="0" anchor="ctr">
-              <a:noAutofit/>
-            </a:bodyPr>
-            <a:lstStyle/>
-            <a:p>
-              <a:pPr marL="0" marR="0" lvl="0" indent="0" algn="ctr" defTabSz="914400" rtl="0" eaLnBrk="1" fontAlgn="auto" latinLnBrk="0" hangingPunct="1">
-                <a:lnSpc>
-                  <a:spcPct val="100000"/>
-                </a:lnSpc>
-                <a:spcBef>
-                  <a:spcPts val="0"/>
-                </a:spcBef>
-                <a:spcAft>
-                  <a:spcPts val="0"/>
-                </a:spcAft>
-                <a:buClrTx/>
-                <a:buSzTx/>
-                <a:buFontTx/>
-                <a:buNone/>
-                <a:tabLst/>
-                <a:defRPr/>
-              </a:pPr>
-              <a:r>
-                <a:rPr kumimoji="0" lang="en-US" sz="1800" b="1" i="0" u="none" strike="noStrike" kern="1200" cap="none" spc="0" normalizeH="0" baseline="0" noProof="0" dirty="0">
-                  <a:ln>
-                    <a:noFill/>
-                  </a:ln>
-                  <a:solidFill>
-                    <a:srgbClr val="FFFF00"/>
-                  </a:solidFill>
-                  <a:effectLst/>
-                  <a:uLnTx/>
-                  <a:uFillTx/>
-                  <a:latin typeface="Consolas" panose="020B0609020204030204" pitchFamily="49" charset="0"/>
-                  <a:ea typeface="+mn-ea"/>
-                  <a:cs typeface="+mn-cs"/>
-                </a:rPr>
-                <a:t>HEAD</a:t>
-              </a:r>
-            </a:p>
-          </p:txBody>
-        </p:sp>
-        <p:sp>
-          <p:nvSpPr>
-            <p:cNvPr id="16" name="Flowchart: Connector 85">
-              <a:extLst>
-                <a:ext uri="{FF2B5EF4-FFF2-40B4-BE49-F238E27FC236}">
-                  <a16:creationId xmlns:a16="http://schemas.microsoft.com/office/drawing/2014/main" id="{B0A4D99F-CA88-587E-5E07-A2657F88DC00}"/>
-                </a:ext>
-              </a:extLst>
-            </p:cNvPr>
-            <p:cNvSpPr/>
-            <p:nvPr/>
-          </p:nvSpPr>
-          <p:spPr>
-            <a:xfrm>
-              <a:off x="2675567" y="3871297"/>
-              <a:ext cx="529341" cy="458946"/>
-            </a:xfrm>
-            <a:prstGeom prst="flowChartConnector">
-              <a:avLst/>
-            </a:prstGeom>
-            <a:solidFill>
-              <a:schemeClr val="accent6"/>
-            </a:solidFill>
-            <a:ln>
+              <a:ln>
+                <a:solidFill>
+                  <a:schemeClr val="tx1"/>
+                </a:solidFill>
+              </a:ln>
+            </p:spPr>
+            <p:txBody>
+              <a:bodyPr wrap="square" lIns="0" rIns="0" rtlCol="0">
+                <a:spAutoFit/>
+              </a:bodyPr>
+              <a:lstStyle/>
+              <a:p>
+                <a:pPr marL="0" marR="0" lvl="0" indent="0" algn="l" defTabSz="914400" rtl="0" eaLnBrk="1" fontAlgn="auto" latinLnBrk="0" hangingPunct="1">
+                  <a:lnSpc>
+                    <a:spcPct val="100000"/>
+                  </a:lnSpc>
+                  <a:spcBef>
+                    <a:spcPts val="0"/>
+                  </a:spcBef>
+                  <a:spcAft>
+                    <a:spcPts val="0"/>
+                  </a:spcAft>
+                  <a:buClrTx/>
+                  <a:buSzTx/>
+                  <a:buFontTx/>
+                  <a:buNone/>
+                  <a:tabLst/>
+                  <a:defRPr/>
+                </a:pPr>
+                <a:r>
+                  <a:rPr kumimoji="0" lang="en-US" sz="1800" b="0" i="0" u="none" strike="noStrike" kern="1200" cap="none" spc="0" normalizeH="0" baseline="0" noProof="0" dirty="0">
+                    <a:ln>
+                      <a:noFill/>
+                    </a:ln>
+                    <a:solidFill>
+                      <a:srgbClr val="F79646">
+                        <a:lumMod val="60000"/>
+                        <a:lumOff val="40000"/>
+                      </a:srgbClr>
+                    </a:solidFill>
+                    <a:effectLst/>
+                    <a:uLnTx/>
+                    <a:uFillTx/>
+                    <a:latin typeface="Consolas" panose="020B0609020204030204" pitchFamily="49" charset="0"/>
+                    <a:ea typeface="+mn-ea"/>
+                    <a:cs typeface="+mn-cs"/>
+                  </a:rPr>
+                  <a:t>master</a:t>
+                </a:r>
+              </a:p>
+            </p:txBody>
+          </p:sp>
+          <p:sp>
+            <p:nvSpPr>
+              <p:cNvPr id="59" name="InSlideAnimateShapec6668a60-df72-441d-a462-fbf247f668dd"/>
+              <p:cNvSpPr txBox="1"/>
+              <p:nvPr/>
+            </p:nvSpPr>
+            <p:spPr>
+              <a:xfrm>
+                <a:off x="1667489" y="3820398"/>
+                <a:ext cx="618009" cy="375073"/>
+              </a:xfrm>
+              <a:prstGeom prst="roundRect">
+                <a:avLst/>
+              </a:prstGeom>
               <a:solidFill>
                 <a:schemeClr val="tx1"/>
               </a:solidFill>
-            </a:ln>
-          </p:spPr>
-          <p:style>
-            <a:lnRef idx="2">
-              <a:schemeClr val="accent3">
-                <a:shade val="50000"/>
-              </a:schemeClr>
-            </a:lnRef>
-            <a:fillRef idx="1">
-              <a:schemeClr val="accent3"/>
-            </a:fillRef>
-            <a:effectRef idx="0">
-              <a:schemeClr val="accent3"/>
-            </a:effectRef>
-            <a:fontRef idx="minor">
-              <a:schemeClr val="lt1"/>
-            </a:fontRef>
-          </p:style>
-          <p:txBody>
-            <a:bodyPr rtlCol="0" anchor="ctr"/>
-            <a:lstStyle/>
-            <a:p>
-              <a:pPr marL="0" marR="0" lvl="0" indent="0" algn="ctr" defTabSz="914400" rtl="0" eaLnBrk="1" fontAlgn="auto" latinLnBrk="0" hangingPunct="1">
-                <a:lnSpc>
-                  <a:spcPct val="100000"/>
-                </a:lnSpc>
-                <a:spcBef>
-                  <a:spcPts val="0"/>
-                </a:spcBef>
-                <a:spcAft>
-                  <a:spcPts val="0"/>
-                </a:spcAft>
-                <a:buClrTx/>
-                <a:buSzTx/>
-                <a:buFontTx/>
-                <a:buNone/>
-                <a:tabLst/>
-                <a:defRPr/>
-              </a:pPr>
-              <a:r>
-                <a:rPr kumimoji="0" lang="en-US" sz="1800" b="0" i="0" u="none" strike="noStrike" kern="1200" cap="none" spc="0" normalizeH="0" baseline="0" noProof="0" dirty="0">
-                  <a:ln>
-                    <a:noFill/>
-                  </a:ln>
-                  <a:solidFill>
-                    <a:prstClr val="white"/>
-                  </a:solidFill>
-                  <a:effectLst/>
-                  <a:uLnTx/>
-                  <a:uFillTx/>
-                  <a:latin typeface="Calibri"/>
-                  <a:ea typeface="+mn-ea"/>
-                  <a:cs typeface="+mn-cs"/>
-                </a:rPr>
-                <a:t>d</a:t>
-              </a:r>
-            </a:p>
-          </p:txBody>
-        </p:sp>
-        <p:cxnSp>
-          <p:nvCxnSpPr>
-            <p:cNvPr id="17" name="Straight Connector 16">
-              <a:extLst>
-                <a:ext uri="{FF2B5EF4-FFF2-40B4-BE49-F238E27FC236}">
-                  <a16:creationId xmlns:a16="http://schemas.microsoft.com/office/drawing/2014/main" id="{732DED6A-3D8F-8C4F-618C-C2291332FD0B}"/>
-                </a:ext>
-              </a:extLst>
-            </p:cNvPr>
-            <p:cNvCxnSpPr>
-              <a:stCxn id="7" idx="0"/>
-              <a:endCxn id="16" idx="4"/>
-            </p:cNvCxnSpPr>
-            <p:nvPr/>
-          </p:nvCxnSpPr>
-          <p:spPr>
-            <a:xfrm flipV="1">
-              <a:off x="2930472" y="4330243"/>
-              <a:ext cx="9766" cy="702120"/>
-            </a:xfrm>
-            <a:prstGeom prst="line">
-              <a:avLst/>
-            </a:prstGeom>
-            <a:solidFill>
-              <a:srgbClr val="C00000"/>
-            </a:solidFill>
-            <a:ln>
-              <a:solidFill>
+              <a:ln>
+                <a:solidFill>
+                  <a:schemeClr val="tx1"/>
+                </a:solidFill>
+              </a:ln>
+            </p:spPr>
+            <p:txBody>
+              <a:bodyPr wrap="square" lIns="0" tIns="0" rIns="0" bIns="0" rtlCol="0" anchor="ctr">
+                <a:noAutofit/>
+              </a:bodyPr>
+              <a:lstStyle/>
+              <a:p>
+                <a:pPr marL="0" marR="0" lvl="0" indent="0" algn="ctr" defTabSz="914400" rtl="0" eaLnBrk="1" fontAlgn="auto" latinLnBrk="0" hangingPunct="1">
+                  <a:lnSpc>
+                    <a:spcPct val="100000"/>
+                  </a:lnSpc>
+                  <a:spcBef>
+                    <a:spcPts val="0"/>
+                  </a:spcBef>
+                  <a:spcAft>
+                    <a:spcPts val="0"/>
+                  </a:spcAft>
+                  <a:buClrTx/>
+                  <a:buSzTx/>
+                  <a:buFontTx/>
+                  <a:buNone/>
+                  <a:tabLst/>
+                  <a:defRPr/>
+                </a:pPr>
+                <a:r>
+                  <a:rPr kumimoji="0" lang="en-US" sz="1800" b="1" i="0" u="none" strike="noStrike" kern="1200" cap="none" spc="0" normalizeH="0" baseline="0" noProof="0" dirty="0">
+                    <a:ln>
+                      <a:noFill/>
+                    </a:ln>
+                    <a:solidFill>
+                      <a:srgbClr val="FFFF00"/>
+                    </a:solidFill>
+                    <a:effectLst/>
+                    <a:uLnTx/>
+                    <a:uFillTx/>
+                    <a:latin typeface="Consolas" panose="020B0609020204030204" pitchFamily="49" charset="0"/>
+                    <a:ea typeface="+mn-ea"/>
+                    <a:cs typeface="+mn-cs"/>
+                  </a:rPr>
+                  <a:t>HEAD</a:t>
+                </a:r>
+              </a:p>
+            </p:txBody>
+          </p:sp>
+          <p:cxnSp>
+            <p:nvCxnSpPr>
+              <p:cNvPr id="60" name="Straight Connector 59"/>
+              <p:cNvCxnSpPr>
+                <a:cxnSpLocks/>
+              </p:cNvCxnSpPr>
+              <p:nvPr/>
+            </p:nvCxnSpPr>
+            <p:spPr>
+              <a:xfrm>
+                <a:off x="2411760" y="3224893"/>
+                <a:ext cx="0" cy="3287970"/>
+              </a:xfrm>
+              <a:prstGeom prst="line">
+                <a:avLst/>
+              </a:prstGeom>
+              <a:ln w="19050">
+                <a:solidFill>
+                  <a:schemeClr val="bg1">
+                    <a:lumMod val="65000"/>
+                  </a:schemeClr>
+                </a:solidFill>
+                <a:prstDash val="sysDash"/>
+              </a:ln>
+            </p:spPr>
+            <p:style>
+              <a:lnRef idx="1">
+                <a:schemeClr val="accent1"/>
+              </a:lnRef>
+              <a:fillRef idx="0">
+                <a:schemeClr val="accent1"/>
+              </a:fillRef>
+              <a:effectRef idx="0">
+                <a:schemeClr val="accent1"/>
+              </a:effectRef>
+              <a:fontRef idx="minor">
                 <a:schemeClr val="tx1"/>
-              </a:solidFill>
-            </a:ln>
-          </p:spPr>
-          <p:style>
-            <a:lnRef idx="2">
-              <a:schemeClr val="accent3">
-                <a:shade val="50000"/>
-              </a:schemeClr>
-            </a:lnRef>
-            <a:fillRef idx="1">
-              <a:schemeClr val="accent3"/>
-            </a:fillRef>
-            <a:effectRef idx="0">
-              <a:schemeClr val="accent3"/>
-            </a:effectRef>
-            <a:fontRef idx="minor">
-              <a:schemeClr val="lt1"/>
-            </a:fontRef>
-          </p:style>
-        </p:cxnSp>
-        <p:grpSp>
-          <p:nvGrpSpPr>
-            <p:cNvPr id="21" name="branch: commit 3">
-              <a:extLst>
-                <a:ext uri="{FF2B5EF4-FFF2-40B4-BE49-F238E27FC236}">
-                  <a16:creationId xmlns:a16="http://schemas.microsoft.com/office/drawing/2014/main" id="{484D216E-095D-C5C1-2E42-75EA365CE03C}"/>
-                </a:ext>
-              </a:extLst>
-            </p:cNvPr>
-            <p:cNvGrpSpPr/>
-            <p:nvPr/>
-          </p:nvGrpSpPr>
-          <p:grpSpPr>
-            <a:xfrm>
-              <a:off x="4081779" y="3294707"/>
-              <a:ext cx="529341" cy="1138559"/>
-              <a:chOff x="3197162" y="4007214"/>
-              <a:chExt cx="529341" cy="1138559"/>
-            </a:xfrm>
-          </p:grpSpPr>
+              </a:fontRef>
+            </p:style>
+          </p:cxnSp>
           <p:sp>
             <p:nvSpPr>
-              <p:cNvPr id="22" name="Flowchart: Connector 90">
-                <a:extLst>
-                  <a:ext uri="{FF2B5EF4-FFF2-40B4-BE49-F238E27FC236}">
-                    <a16:creationId xmlns:a16="http://schemas.microsoft.com/office/drawing/2014/main" id="{5A37F7A2-5EA1-3523-5CFD-CB51ED7196ED}"/>
-                  </a:ext>
-                </a:extLst>
-              </p:cNvPr>
+              <p:cNvPr id="69" name="Flowchart: Connector 68"/>
               <p:cNvSpPr/>
               <p:nvPr/>
             </p:nvSpPr>
             <p:spPr>
               <a:xfrm>
-                <a:off x="3197162" y="4007214"/>
+                <a:off x="142143" y="3859669"/>
                 <a:ext cx="529341" cy="458946"/>
               </a:xfrm>
               <a:prstGeom prst="flowChartConnector">
                 <a:avLst/>
               </a:prstGeom>
               <a:solidFill>
-                <a:srgbClr val="0070C0"/>
+                <a:schemeClr val="accent6"/>
               </a:solidFill>
               <a:ln>
                 <a:solidFill>
@@ -7578,54 +6158,45 @@
                   <a:defRPr/>
                 </a:pPr>
                 <a:r>
-                  <a:rPr lang="en-US" dirty="0">
+                  <a:rPr kumimoji="0" lang="en-US" sz="1800" b="0" i="0" u="none" strike="noStrike" kern="1200" cap="none" spc="0" normalizeH="0" baseline="0" noProof="0" dirty="0">
+                    <a:ln>
+                      <a:noFill/>
+                    </a:ln>
                     <a:solidFill>
                       <a:prstClr val="white"/>
                     </a:solidFill>
+                    <a:effectLst/>
+                    <a:uLnTx/>
+                    <a:uFillTx/>
                     <a:latin typeface="Calibri"/>
+                    <a:ea typeface="+mn-ea"/>
+                    <a:cs typeface="+mn-cs"/>
                   </a:rPr>
-                  <a:t>e</a:t>
+                  <a:t>d</a:t>
                 </a:r>
-                <a:endParaRPr kumimoji="0" lang="en-US" sz="1800" b="0" i="0" u="none" strike="noStrike" kern="1200" cap="none" spc="0" normalizeH="0" baseline="0" noProof="0" dirty="0">
-                  <a:ln>
-                    <a:noFill/>
-                  </a:ln>
-                  <a:solidFill>
-                    <a:prstClr val="white"/>
-                  </a:solidFill>
-                  <a:effectLst/>
-                  <a:uLnTx/>
-                  <a:uFillTx/>
-                  <a:latin typeface="Calibri"/>
-                  <a:ea typeface="+mn-ea"/>
-                  <a:cs typeface="+mn-cs"/>
-                </a:endParaRPr>
               </a:p>
             </p:txBody>
           </p:sp>
           <p:cxnSp>
             <p:nvCxnSpPr>
-              <p:cNvPr id="23" name="Straight Connector 22">
-                <a:extLst>
-                  <a:ext uri="{FF2B5EF4-FFF2-40B4-BE49-F238E27FC236}">
-                    <a16:creationId xmlns:a16="http://schemas.microsoft.com/office/drawing/2014/main" id="{57B695E3-7D94-98C5-949E-0EF141DF5B64}"/>
-                  </a:ext>
-                </a:extLst>
-              </p:cNvPr>
+              <p:cNvPr id="73" name="Straight Connector 72"/>
               <p:cNvCxnSpPr>
-                <a:stCxn id="11" idx="0"/>
-                <a:endCxn id="22" idx="4"/>
+                <a:stCxn id="43" idx="0"/>
+                <a:endCxn id="69" idx="4"/>
               </p:cNvCxnSpPr>
               <p:nvPr/>
             </p:nvCxnSpPr>
             <p:spPr>
-              <a:xfrm flipH="1" flipV="1">
-                <a:off x="3461833" y="4466160"/>
-                <a:ext cx="4835" cy="679613"/>
+              <a:xfrm flipV="1">
+                <a:off x="397048" y="4318615"/>
+                <a:ext cx="9766" cy="721105"/>
               </a:xfrm>
               <a:prstGeom prst="line">
                 <a:avLst/>
               </a:prstGeom>
+              <a:solidFill>
+                <a:srgbClr val="C00000"/>
+              </a:solidFill>
               <a:ln>
                 <a:solidFill>
                   <a:schemeClr val="tx1"/>
@@ -7649,85 +6220,1681 @@
               </a:fontRef>
             </p:style>
           </p:cxnSp>
+          <p:sp>
+            <p:nvSpPr>
+              <p:cNvPr id="109" name="Down Arrow 71"/>
+              <p:cNvSpPr/>
+              <p:nvPr/>
+            </p:nvSpPr>
+            <p:spPr>
+              <a:xfrm rot="16200000">
+                <a:off x="2092964" y="5443668"/>
+                <a:ext cx="432048" cy="391906"/>
+              </a:xfrm>
+              <a:prstGeom prst="downArrow">
+                <a:avLst/>
+              </a:prstGeom>
+              <a:solidFill>
+                <a:schemeClr val="bg1">
+                  <a:lumMod val="85000"/>
+                </a:schemeClr>
+              </a:solidFill>
+              <a:ln>
+                <a:solidFill>
+                  <a:schemeClr val="bg1">
+                    <a:lumMod val="65000"/>
+                  </a:schemeClr>
+                </a:solidFill>
+              </a:ln>
+            </p:spPr>
+            <p:style>
+              <a:lnRef idx="2">
+                <a:schemeClr val="accent1">
+                  <a:shade val="50000"/>
+                </a:schemeClr>
+              </a:lnRef>
+              <a:fillRef idx="1">
+                <a:schemeClr val="accent1"/>
+              </a:fillRef>
+              <a:effectRef idx="0">
+                <a:schemeClr val="accent1"/>
+              </a:effectRef>
+              <a:fontRef idx="minor">
+                <a:schemeClr val="lt1"/>
+              </a:fontRef>
+            </p:style>
+            <p:txBody>
+              <a:bodyPr rtlCol="0" anchor="ctr"/>
+              <a:lstStyle/>
+              <a:p>
+                <a:pPr algn="ctr"/>
+                <a:endParaRPr lang="en-US"/>
+              </a:p>
+            </p:txBody>
+          </p:sp>
+          <p:sp>
+            <p:nvSpPr>
+              <p:cNvPr id="7" name="Flowchart: Connector 73">
+                <a:extLst>
+                  <a:ext uri="{FF2B5EF4-FFF2-40B4-BE49-F238E27FC236}">
+                    <a16:creationId xmlns:a16="http://schemas.microsoft.com/office/drawing/2014/main" id="{62DB80E4-3140-D73F-B207-C86A74256913}"/>
+                  </a:ext>
+                </a:extLst>
+              </p:cNvPr>
+              <p:cNvSpPr/>
+              <p:nvPr/>
+            </p:nvSpPr>
+            <p:spPr>
+              <a:xfrm>
+                <a:off x="2665801" y="5032363"/>
+                <a:ext cx="529341" cy="458946"/>
+              </a:xfrm>
+              <a:prstGeom prst="flowChartConnector">
+                <a:avLst/>
+              </a:prstGeom>
+              <a:solidFill>
+                <a:schemeClr val="accent6"/>
+              </a:solidFill>
+              <a:ln>
+                <a:solidFill>
+                  <a:schemeClr val="tx1"/>
+                </a:solidFill>
+              </a:ln>
+            </p:spPr>
+            <p:style>
+              <a:lnRef idx="2">
+                <a:schemeClr val="accent3">
+                  <a:shade val="50000"/>
+                </a:schemeClr>
+              </a:lnRef>
+              <a:fillRef idx="1">
+                <a:schemeClr val="accent3"/>
+              </a:fillRef>
+              <a:effectRef idx="0">
+                <a:schemeClr val="accent3"/>
+              </a:effectRef>
+              <a:fontRef idx="minor">
+                <a:schemeClr val="lt1"/>
+              </a:fontRef>
+            </p:style>
+            <p:txBody>
+              <a:bodyPr rtlCol="0" anchor="ctr"/>
+              <a:lstStyle/>
+              <a:p>
+                <a:pPr marL="0" marR="0" lvl="0" indent="0" algn="ctr" defTabSz="914400" rtl="0" eaLnBrk="1" fontAlgn="auto" latinLnBrk="0" hangingPunct="1">
+                  <a:lnSpc>
+                    <a:spcPct val="100000"/>
+                  </a:lnSpc>
+                  <a:spcBef>
+                    <a:spcPts val="0"/>
+                  </a:spcBef>
+                  <a:spcAft>
+                    <a:spcPts val="0"/>
+                  </a:spcAft>
+                  <a:buClrTx/>
+                  <a:buSzTx/>
+                  <a:buFontTx/>
+                  <a:buNone/>
+                  <a:tabLst/>
+                  <a:defRPr/>
+                </a:pPr>
+                <a:r>
+                  <a:rPr kumimoji="0" lang="en-US" sz="1800" b="0" i="0" u="none" strike="noStrike" kern="1200" cap="none" spc="0" normalizeH="0" baseline="0" noProof="0" dirty="0">
+                    <a:ln>
+                      <a:noFill/>
+                    </a:ln>
+                    <a:solidFill>
+                      <a:prstClr val="white"/>
+                    </a:solidFill>
+                    <a:effectLst/>
+                    <a:uLnTx/>
+                    <a:uFillTx/>
+                    <a:latin typeface="Calibri"/>
+                    <a:ea typeface="+mn-ea"/>
+                    <a:cs typeface="+mn-cs"/>
+                  </a:rPr>
+                  <a:t>b</a:t>
+                </a:r>
+              </a:p>
+            </p:txBody>
+          </p:sp>
+          <p:sp>
+            <p:nvSpPr>
+              <p:cNvPr id="8" name="Flowchart: Connector 74">
+                <a:extLst>
+                  <a:ext uri="{FF2B5EF4-FFF2-40B4-BE49-F238E27FC236}">
+                    <a16:creationId xmlns:a16="http://schemas.microsoft.com/office/drawing/2014/main" id="{2FED90CE-265F-05ED-B6E9-2571BC852C51}"/>
+                  </a:ext>
+                </a:extLst>
+              </p:cNvPr>
+              <p:cNvSpPr/>
+              <p:nvPr/>
+            </p:nvSpPr>
+            <p:spPr>
+              <a:xfrm>
+                <a:off x="2659316" y="5773220"/>
+                <a:ext cx="529341" cy="458946"/>
+              </a:xfrm>
+              <a:prstGeom prst="flowChartConnector">
+                <a:avLst/>
+              </a:prstGeom>
+              <a:solidFill>
+                <a:schemeClr val="accent6"/>
+              </a:solidFill>
+              <a:ln>
+                <a:solidFill>
+                  <a:schemeClr val="tx1"/>
+                </a:solidFill>
+              </a:ln>
+            </p:spPr>
+            <p:style>
+              <a:lnRef idx="2">
+                <a:schemeClr val="accent3">
+                  <a:shade val="50000"/>
+                </a:schemeClr>
+              </a:lnRef>
+              <a:fillRef idx="1">
+                <a:schemeClr val="accent3"/>
+              </a:fillRef>
+              <a:effectRef idx="0">
+                <a:schemeClr val="accent3"/>
+              </a:effectRef>
+              <a:fontRef idx="minor">
+                <a:schemeClr val="lt1"/>
+              </a:fontRef>
+            </p:style>
+            <p:txBody>
+              <a:bodyPr rtlCol="0" anchor="ctr"/>
+              <a:lstStyle/>
+              <a:p>
+                <a:pPr marL="0" marR="0" lvl="0" indent="0" algn="ctr" defTabSz="914400" rtl="0" eaLnBrk="1" fontAlgn="auto" latinLnBrk="0" hangingPunct="1">
+                  <a:lnSpc>
+                    <a:spcPct val="100000"/>
+                  </a:lnSpc>
+                  <a:spcBef>
+                    <a:spcPts val="0"/>
+                  </a:spcBef>
+                  <a:spcAft>
+                    <a:spcPts val="0"/>
+                  </a:spcAft>
+                  <a:buClrTx/>
+                  <a:buSzTx/>
+                  <a:buFontTx/>
+                  <a:buNone/>
+                  <a:tabLst/>
+                  <a:defRPr/>
+                </a:pPr>
+                <a:r>
+                  <a:rPr kumimoji="0" lang="en-US" sz="1800" b="0" i="0" u="none" strike="noStrike" kern="1200" cap="none" spc="0" normalizeH="0" baseline="0" noProof="0" dirty="0">
+                    <a:ln>
+                      <a:noFill/>
+                    </a:ln>
+                    <a:solidFill>
+                      <a:prstClr val="white"/>
+                    </a:solidFill>
+                    <a:effectLst/>
+                    <a:uLnTx/>
+                    <a:uFillTx/>
+                    <a:latin typeface="Calibri"/>
+                    <a:ea typeface="+mn-ea"/>
+                    <a:cs typeface="+mn-cs"/>
+                  </a:rPr>
+                  <a:t>a</a:t>
+                </a:r>
+              </a:p>
+            </p:txBody>
+          </p:sp>
+          <p:cxnSp>
+            <p:nvCxnSpPr>
+              <p:cNvPr id="9" name="Straight Connector 8">
+                <a:extLst>
+                  <a:ext uri="{FF2B5EF4-FFF2-40B4-BE49-F238E27FC236}">
+                    <a16:creationId xmlns:a16="http://schemas.microsoft.com/office/drawing/2014/main" id="{6628CA7E-C6D5-869E-754B-F2A346A44734}"/>
+                  </a:ext>
+                </a:extLst>
+              </p:cNvPr>
+              <p:cNvCxnSpPr>
+                <a:stCxn id="8" idx="0"/>
+                <a:endCxn id="7" idx="4"/>
+              </p:cNvCxnSpPr>
+              <p:nvPr/>
+            </p:nvCxnSpPr>
+            <p:spPr>
+              <a:xfrm flipV="1">
+                <a:off x="2923987" y="5491309"/>
+                <a:ext cx="6485" cy="281911"/>
+              </a:xfrm>
+              <a:prstGeom prst="line">
+                <a:avLst/>
+              </a:prstGeom>
+              <a:solidFill>
+                <a:srgbClr val="C00000"/>
+              </a:solidFill>
+              <a:ln>
+                <a:solidFill>
+                  <a:schemeClr val="tx1"/>
+                </a:solidFill>
+              </a:ln>
+            </p:spPr>
+            <p:style>
+              <a:lnRef idx="2">
+                <a:schemeClr val="accent3">
+                  <a:shade val="50000"/>
+                </a:schemeClr>
+              </a:lnRef>
+              <a:fillRef idx="1">
+                <a:schemeClr val="accent3"/>
+              </a:fillRef>
+              <a:effectRef idx="0">
+                <a:schemeClr val="accent3"/>
+              </a:effectRef>
+              <a:fontRef idx="minor">
+                <a:schemeClr val="lt1"/>
+              </a:fontRef>
+            </p:style>
+          </p:cxnSp>
+          <p:grpSp>
+            <p:nvGrpSpPr>
+              <p:cNvPr id="10" name="branch: commit 3">
+                <a:extLst>
+                  <a:ext uri="{FF2B5EF4-FFF2-40B4-BE49-F238E27FC236}">
+                    <a16:creationId xmlns:a16="http://schemas.microsoft.com/office/drawing/2014/main" id="{4F939BFE-249C-D829-3AC9-506ED44D2F5B}"/>
+                  </a:ext>
+                </a:extLst>
+              </p:cNvPr>
+              <p:cNvGrpSpPr/>
+              <p:nvPr/>
+            </p:nvGrpSpPr>
+            <p:grpSpPr>
+              <a:xfrm>
+                <a:off x="3195142" y="4433266"/>
+                <a:ext cx="1420813" cy="828570"/>
+                <a:chOff x="2404518" y="4177959"/>
+                <a:chExt cx="1420813" cy="828570"/>
+              </a:xfrm>
+            </p:grpSpPr>
+            <p:sp>
+              <p:nvSpPr>
+                <p:cNvPr id="11" name="Flowchart: Connector 79">
+                  <a:extLst>
+                    <a:ext uri="{FF2B5EF4-FFF2-40B4-BE49-F238E27FC236}">
+                      <a16:creationId xmlns:a16="http://schemas.microsoft.com/office/drawing/2014/main" id="{238D36CE-9E50-FBA4-2FC1-5B1B168309E8}"/>
+                    </a:ext>
+                  </a:extLst>
+                </p:cNvPr>
+                <p:cNvSpPr/>
+                <p:nvPr/>
+              </p:nvSpPr>
+              <p:spPr>
+                <a:xfrm>
+                  <a:off x="3295990" y="4177959"/>
+                  <a:ext cx="529341" cy="458946"/>
+                </a:xfrm>
+                <a:prstGeom prst="flowChartConnector">
+                  <a:avLst/>
+                </a:prstGeom>
+                <a:solidFill>
+                  <a:srgbClr val="0070C0"/>
+                </a:solidFill>
+                <a:ln>
+                  <a:solidFill>
+                    <a:schemeClr val="tx1"/>
+                  </a:solidFill>
+                </a:ln>
+              </p:spPr>
+              <p:style>
+                <a:lnRef idx="2">
+                  <a:schemeClr val="accent3">
+                    <a:shade val="50000"/>
+                  </a:schemeClr>
+                </a:lnRef>
+                <a:fillRef idx="1">
+                  <a:schemeClr val="accent3"/>
+                </a:fillRef>
+                <a:effectRef idx="0">
+                  <a:schemeClr val="accent3"/>
+                </a:effectRef>
+                <a:fontRef idx="minor">
+                  <a:schemeClr val="lt1"/>
+                </a:fontRef>
+              </p:style>
+              <p:txBody>
+                <a:bodyPr rtlCol="0" anchor="ctr"/>
+                <a:lstStyle/>
+                <a:p>
+                  <a:pPr marL="0" marR="0" lvl="0" indent="0" algn="ctr" defTabSz="914400" rtl="0" eaLnBrk="1" fontAlgn="auto" latinLnBrk="0" hangingPunct="1">
+                    <a:lnSpc>
+                      <a:spcPct val="100000"/>
+                    </a:lnSpc>
+                    <a:spcBef>
+                      <a:spcPts val="0"/>
+                    </a:spcBef>
+                    <a:spcAft>
+                      <a:spcPts val="0"/>
+                    </a:spcAft>
+                    <a:buClrTx/>
+                    <a:buSzTx/>
+                    <a:buFontTx/>
+                    <a:buNone/>
+                    <a:tabLst/>
+                    <a:defRPr/>
+                  </a:pPr>
+                  <a:r>
+                    <a:rPr kumimoji="0" lang="en-US" sz="1800" b="0" i="0" u="none" strike="noStrike" kern="1200" cap="none" spc="0" normalizeH="0" baseline="0" noProof="0" dirty="0">
+                      <a:ln>
+                        <a:noFill/>
+                      </a:ln>
+                      <a:solidFill>
+                        <a:prstClr val="white"/>
+                      </a:solidFill>
+                      <a:effectLst/>
+                      <a:uLnTx/>
+                      <a:uFillTx/>
+                      <a:latin typeface="Calibri"/>
+                      <a:ea typeface="+mn-ea"/>
+                      <a:cs typeface="+mn-cs"/>
+                    </a:rPr>
+                    <a:t>c</a:t>
+                  </a:r>
+                </a:p>
+              </p:txBody>
+            </p:sp>
+            <p:cxnSp>
+              <p:nvCxnSpPr>
+                <p:cNvPr id="12" name="Straight Connector 11">
+                  <a:extLst>
+                    <a:ext uri="{FF2B5EF4-FFF2-40B4-BE49-F238E27FC236}">
+                      <a16:creationId xmlns:a16="http://schemas.microsoft.com/office/drawing/2014/main" id="{6E21980D-460C-F9F0-ABE1-69B042307DEF}"/>
+                    </a:ext>
+                  </a:extLst>
+                </p:cNvPr>
+                <p:cNvCxnSpPr>
+                  <a:cxnSpLocks/>
+                  <a:stCxn id="7" idx="6"/>
+                  <a:endCxn id="11" idx="3"/>
+                </p:cNvCxnSpPr>
+                <p:nvPr/>
+              </p:nvCxnSpPr>
+              <p:spPr>
+                <a:xfrm flipV="1">
+                  <a:off x="2404518" y="4569694"/>
+                  <a:ext cx="968992" cy="436835"/>
+                </a:xfrm>
+                <a:prstGeom prst="line">
+                  <a:avLst/>
+                </a:prstGeom>
+                <a:ln>
+                  <a:solidFill>
+                    <a:schemeClr val="tx1"/>
+                  </a:solidFill>
+                </a:ln>
+              </p:spPr>
+              <p:style>
+                <a:lnRef idx="2">
+                  <a:schemeClr val="accent3">
+                    <a:shade val="50000"/>
+                  </a:schemeClr>
+                </a:lnRef>
+                <a:fillRef idx="1">
+                  <a:schemeClr val="accent3"/>
+                </a:fillRef>
+                <a:effectRef idx="0">
+                  <a:schemeClr val="accent3"/>
+                </a:effectRef>
+                <a:fontRef idx="minor">
+                  <a:schemeClr val="lt1"/>
+                </a:fontRef>
+              </p:style>
+            </p:cxnSp>
+          </p:grpSp>
+          <p:sp>
+            <p:nvSpPr>
+              <p:cNvPr id="13" name="InSlideAnimateShapef6670a49-3898-4e8c-8403-b30b80627c4a">
+                <a:extLst>
+                  <a:ext uri="{FF2B5EF4-FFF2-40B4-BE49-F238E27FC236}">
+                    <a16:creationId xmlns:a16="http://schemas.microsoft.com/office/drawing/2014/main" id="{44038113-90FC-D451-E56A-1499CE153442}"/>
+                  </a:ext>
+                </a:extLst>
+              </p:cNvPr>
+              <p:cNvSpPr txBox="1">
+                <a:spLocks/>
+              </p:cNvSpPr>
+              <p:nvPr/>
+            </p:nvSpPr>
+            <p:spPr>
+              <a:xfrm flipH="1">
+                <a:off x="4671930" y="3340094"/>
+                <a:ext cx="607226" cy="369332"/>
+              </a:xfrm>
+              <a:prstGeom prst="rightArrow">
+                <a:avLst>
+                  <a:gd name="adj1" fmla="val 100000"/>
+                  <a:gd name="adj2" fmla="val 22939"/>
+                </a:avLst>
+              </a:prstGeom>
+              <a:solidFill>
+                <a:schemeClr val="tx1"/>
+              </a:solidFill>
+              <a:ln>
+                <a:solidFill>
+                  <a:schemeClr val="tx1"/>
+                </a:solidFill>
+              </a:ln>
+            </p:spPr>
+            <p:txBody>
+              <a:bodyPr wrap="square" lIns="0" rIns="0" rtlCol="0">
+                <a:spAutoFit/>
+              </a:bodyPr>
+              <a:lstStyle/>
+              <a:p>
+                <a:pPr marL="0" marR="0" lvl="0" indent="0" algn="l" defTabSz="914400" rtl="0" eaLnBrk="1" fontAlgn="auto" latinLnBrk="0" hangingPunct="1">
+                  <a:lnSpc>
+                    <a:spcPct val="100000"/>
+                  </a:lnSpc>
+                  <a:spcBef>
+                    <a:spcPts val="0"/>
+                  </a:spcBef>
+                  <a:spcAft>
+                    <a:spcPts val="0"/>
+                  </a:spcAft>
+                  <a:buClrTx/>
+                  <a:buSzTx/>
+                  <a:buFontTx/>
+                  <a:buNone/>
+                  <a:tabLst/>
+                  <a:defRPr/>
+                </a:pPr>
+                <a:r>
+                  <a:rPr kumimoji="0" lang="en-US" sz="1800" b="0" i="0" u="none" strike="noStrike" kern="1200" cap="none" spc="0" normalizeH="0" baseline="0" noProof="0" dirty="0">
+                    <a:ln>
+                      <a:noFill/>
+                    </a:ln>
+                    <a:solidFill>
+                      <a:srgbClr val="00B0F0"/>
+                    </a:solidFill>
+                    <a:effectLst/>
+                    <a:uLnTx/>
+                    <a:uFillTx/>
+                    <a:latin typeface="Consolas" panose="020B0609020204030204" pitchFamily="49" charset="0"/>
+                    <a:ea typeface="+mn-ea"/>
+                    <a:cs typeface="+mn-cs"/>
+                  </a:rPr>
+                  <a:t>fix1</a:t>
+                </a:r>
+              </a:p>
+            </p:txBody>
+          </p:sp>
+          <p:sp>
+            <p:nvSpPr>
+              <p:cNvPr id="15" name="InSlideAnimateShapec6668a60-df72-441d-a462-fbf247f668dd">
+                <a:extLst>
+                  <a:ext uri="{FF2B5EF4-FFF2-40B4-BE49-F238E27FC236}">
+                    <a16:creationId xmlns:a16="http://schemas.microsoft.com/office/drawing/2014/main" id="{6B36A784-7B43-CE19-D204-257D6732722A}"/>
+                  </a:ext>
+                </a:extLst>
+              </p:cNvPr>
+              <p:cNvSpPr txBox="1"/>
+              <p:nvPr/>
+            </p:nvSpPr>
+            <p:spPr>
+              <a:xfrm>
+                <a:off x="5309278" y="3334162"/>
+                <a:ext cx="618009" cy="375073"/>
+              </a:xfrm>
+              <a:prstGeom prst="roundRect">
+                <a:avLst/>
+              </a:prstGeom>
+              <a:solidFill>
+                <a:schemeClr val="tx1"/>
+              </a:solidFill>
+              <a:ln>
+                <a:solidFill>
+                  <a:schemeClr val="tx1"/>
+                </a:solidFill>
+              </a:ln>
+            </p:spPr>
+            <p:txBody>
+              <a:bodyPr wrap="square" lIns="0" tIns="0" rIns="0" bIns="0" rtlCol="0" anchor="ctr">
+                <a:noAutofit/>
+              </a:bodyPr>
+              <a:lstStyle/>
+              <a:p>
+                <a:pPr marL="0" marR="0" lvl="0" indent="0" algn="ctr" defTabSz="914400" rtl="0" eaLnBrk="1" fontAlgn="auto" latinLnBrk="0" hangingPunct="1">
+                  <a:lnSpc>
+                    <a:spcPct val="100000"/>
+                  </a:lnSpc>
+                  <a:spcBef>
+                    <a:spcPts val="0"/>
+                  </a:spcBef>
+                  <a:spcAft>
+                    <a:spcPts val="0"/>
+                  </a:spcAft>
+                  <a:buClrTx/>
+                  <a:buSzTx/>
+                  <a:buFontTx/>
+                  <a:buNone/>
+                  <a:tabLst/>
+                  <a:defRPr/>
+                </a:pPr>
+                <a:r>
+                  <a:rPr kumimoji="0" lang="en-US" sz="1800" b="1" i="0" u="none" strike="noStrike" kern="1200" cap="none" spc="0" normalizeH="0" baseline="0" noProof="0" dirty="0">
+                    <a:ln>
+                      <a:noFill/>
+                    </a:ln>
+                    <a:solidFill>
+                      <a:srgbClr val="FFFF00"/>
+                    </a:solidFill>
+                    <a:effectLst/>
+                    <a:uLnTx/>
+                    <a:uFillTx/>
+                    <a:latin typeface="Consolas" panose="020B0609020204030204" pitchFamily="49" charset="0"/>
+                    <a:ea typeface="+mn-ea"/>
+                    <a:cs typeface="+mn-cs"/>
+                  </a:rPr>
+                  <a:t>HEAD</a:t>
+                </a:r>
+              </a:p>
+            </p:txBody>
+          </p:sp>
+          <p:sp>
+            <p:nvSpPr>
+              <p:cNvPr id="16" name="Flowchart: Connector 85">
+                <a:extLst>
+                  <a:ext uri="{FF2B5EF4-FFF2-40B4-BE49-F238E27FC236}">
+                    <a16:creationId xmlns:a16="http://schemas.microsoft.com/office/drawing/2014/main" id="{B0A4D99F-CA88-587E-5E07-A2657F88DC00}"/>
+                  </a:ext>
+                </a:extLst>
+              </p:cNvPr>
+              <p:cNvSpPr/>
+              <p:nvPr/>
+            </p:nvSpPr>
+            <p:spPr>
+              <a:xfrm>
+                <a:off x="2675567" y="3871297"/>
+                <a:ext cx="529341" cy="458946"/>
+              </a:xfrm>
+              <a:prstGeom prst="flowChartConnector">
+                <a:avLst/>
+              </a:prstGeom>
+              <a:solidFill>
+                <a:schemeClr val="accent6"/>
+              </a:solidFill>
+              <a:ln>
+                <a:solidFill>
+                  <a:schemeClr val="tx1"/>
+                </a:solidFill>
+              </a:ln>
+            </p:spPr>
+            <p:style>
+              <a:lnRef idx="2">
+                <a:schemeClr val="accent3">
+                  <a:shade val="50000"/>
+                </a:schemeClr>
+              </a:lnRef>
+              <a:fillRef idx="1">
+                <a:schemeClr val="accent3"/>
+              </a:fillRef>
+              <a:effectRef idx="0">
+                <a:schemeClr val="accent3"/>
+              </a:effectRef>
+              <a:fontRef idx="minor">
+                <a:schemeClr val="lt1"/>
+              </a:fontRef>
+            </p:style>
+            <p:txBody>
+              <a:bodyPr rtlCol="0" anchor="ctr"/>
+              <a:lstStyle/>
+              <a:p>
+                <a:pPr marL="0" marR="0" lvl="0" indent="0" algn="ctr" defTabSz="914400" rtl="0" eaLnBrk="1" fontAlgn="auto" latinLnBrk="0" hangingPunct="1">
+                  <a:lnSpc>
+                    <a:spcPct val="100000"/>
+                  </a:lnSpc>
+                  <a:spcBef>
+                    <a:spcPts val="0"/>
+                  </a:spcBef>
+                  <a:spcAft>
+                    <a:spcPts val="0"/>
+                  </a:spcAft>
+                  <a:buClrTx/>
+                  <a:buSzTx/>
+                  <a:buFontTx/>
+                  <a:buNone/>
+                  <a:tabLst/>
+                  <a:defRPr/>
+                </a:pPr>
+                <a:r>
+                  <a:rPr kumimoji="0" lang="en-US" sz="1800" b="0" i="0" u="none" strike="noStrike" kern="1200" cap="none" spc="0" normalizeH="0" baseline="0" noProof="0" dirty="0">
+                    <a:ln>
+                      <a:noFill/>
+                    </a:ln>
+                    <a:solidFill>
+                      <a:prstClr val="white"/>
+                    </a:solidFill>
+                    <a:effectLst/>
+                    <a:uLnTx/>
+                    <a:uFillTx/>
+                    <a:latin typeface="Calibri"/>
+                    <a:ea typeface="+mn-ea"/>
+                    <a:cs typeface="+mn-cs"/>
+                  </a:rPr>
+                  <a:t>d</a:t>
+                </a:r>
+              </a:p>
+            </p:txBody>
+          </p:sp>
+          <p:cxnSp>
+            <p:nvCxnSpPr>
+              <p:cNvPr id="17" name="Straight Connector 16">
+                <a:extLst>
+                  <a:ext uri="{FF2B5EF4-FFF2-40B4-BE49-F238E27FC236}">
+                    <a16:creationId xmlns:a16="http://schemas.microsoft.com/office/drawing/2014/main" id="{732DED6A-3D8F-8C4F-618C-C2291332FD0B}"/>
+                  </a:ext>
+                </a:extLst>
+              </p:cNvPr>
+              <p:cNvCxnSpPr>
+                <a:stCxn id="7" idx="0"/>
+                <a:endCxn id="16" idx="4"/>
+              </p:cNvCxnSpPr>
+              <p:nvPr/>
+            </p:nvCxnSpPr>
+            <p:spPr>
+              <a:xfrm flipV="1">
+                <a:off x="2930472" y="4330243"/>
+                <a:ext cx="9766" cy="702120"/>
+              </a:xfrm>
+              <a:prstGeom prst="line">
+                <a:avLst/>
+              </a:prstGeom>
+              <a:solidFill>
+                <a:srgbClr val="C00000"/>
+              </a:solidFill>
+              <a:ln>
+                <a:solidFill>
+                  <a:schemeClr val="tx1"/>
+                </a:solidFill>
+              </a:ln>
+            </p:spPr>
+            <p:style>
+              <a:lnRef idx="2">
+                <a:schemeClr val="accent3">
+                  <a:shade val="50000"/>
+                </a:schemeClr>
+              </a:lnRef>
+              <a:fillRef idx="1">
+                <a:schemeClr val="accent3"/>
+              </a:fillRef>
+              <a:effectRef idx="0">
+                <a:schemeClr val="accent3"/>
+              </a:effectRef>
+              <a:fontRef idx="minor">
+                <a:schemeClr val="lt1"/>
+              </a:fontRef>
+            </p:style>
+          </p:cxnSp>
+          <p:grpSp>
+            <p:nvGrpSpPr>
+              <p:cNvPr id="21" name="branch: commit 3">
+                <a:extLst>
+                  <a:ext uri="{FF2B5EF4-FFF2-40B4-BE49-F238E27FC236}">
+                    <a16:creationId xmlns:a16="http://schemas.microsoft.com/office/drawing/2014/main" id="{484D216E-095D-C5C1-2E42-75EA365CE03C}"/>
+                  </a:ext>
+                </a:extLst>
+              </p:cNvPr>
+              <p:cNvGrpSpPr/>
+              <p:nvPr/>
+            </p:nvGrpSpPr>
+            <p:grpSpPr>
+              <a:xfrm>
+                <a:off x="4081779" y="3294707"/>
+                <a:ext cx="529341" cy="1138559"/>
+                <a:chOff x="3197162" y="4007214"/>
+                <a:chExt cx="529341" cy="1138559"/>
+              </a:xfrm>
+            </p:grpSpPr>
+            <p:sp>
+              <p:nvSpPr>
+                <p:cNvPr id="22" name="Flowchart: Connector 90">
+                  <a:extLst>
+                    <a:ext uri="{FF2B5EF4-FFF2-40B4-BE49-F238E27FC236}">
+                      <a16:creationId xmlns:a16="http://schemas.microsoft.com/office/drawing/2014/main" id="{5A37F7A2-5EA1-3523-5CFD-CB51ED7196ED}"/>
+                    </a:ext>
+                  </a:extLst>
+                </p:cNvPr>
+                <p:cNvSpPr/>
+                <p:nvPr/>
+              </p:nvSpPr>
+              <p:spPr>
+                <a:xfrm>
+                  <a:off x="3197162" y="4007214"/>
+                  <a:ext cx="529341" cy="458946"/>
+                </a:xfrm>
+                <a:prstGeom prst="flowChartConnector">
+                  <a:avLst/>
+                </a:prstGeom>
+                <a:solidFill>
+                  <a:srgbClr val="0070C0"/>
+                </a:solidFill>
+                <a:ln>
+                  <a:solidFill>
+                    <a:schemeClr val="tx1"/>
+                  </a:solidFill>
+                </a:ln>
+              </p:spPr>
+              <p:style>
+                <a:lnRef idx="2">
+                  <a:schemeClr val="accent3">
+                    <a:shade val="50000"/>
+                  </a:schemeClr>
+                </a:lnRef>
+                <a:fillRef idx="1">
+                  <a:schemeClr val="accent3"/>
+                </a:fillRef>
+                <a:effectRef idx="0">
+                  <a:schemeClr val="accent3"/>
+                </a:effectRef>
+                <a:fontRef idx="minor">
+                  <a:schemeClr val="lt1"/>
+                </a:fontRef>
+              </p:style>
+              <p:txBody>
+                <a:bodyPr rtlCol="0" anchor="ctr"/>
+                <a:lstStyle/>
+                <a:p>
+                  <a:pPr marL="0" marR="0" lvl="0" indent="0" algn="ctr" defTabSz="914400" rtl="0" eaLnBrk="1" fontAlgn="auto" latinLnBrk="0" hangingPunct="1">
+                    <a:lnSpc>
+                      <a:spcPct val="100000"/>
+                    </a:lnSpc>
+                    <a:spcBef>
+                      <a:spcPts val="0"/>
+                    </a:spcBef>
+                    <a:spcAft>
+                      <a:spcPts val="0"/>
+                    </a:spcAft>
+                    <a:buClrTx/>
+                    <a:buSzTx/>
+                    <a:buFontTx/>
+                    <a:buNone/>
+                    <a:tabLst/>
+                    <a:defRPr/>
+                  </a:pPr>
+                  <a:r>
+                    <a:rPr lang="en-US" dirty="0">
+                      <a:solidFill>
+                        <a:prstClr val="white"/>
+                      </a:solidFill>
+                      <a:latin typeface="Calibri"/>
+                    </a:rPr>
+                    <a:t>e</a:t>
+                  </a:r>
+                  <a:endParaRPr kumimoji="0" lang="en-US" sz="1800" b="0" i="0" u="none" strike="noStrike" kern="1200" cap="none" spc="0" normalizeH="0" baseline="0" noProof="0" dirty="0">
+                    <a:ln>
+                      <a:noFill/>
+                    </a:ln>
+                    <a:solidFill>
+                      <a:prstClr val="white"/>
+                    </a:solidFill>
+                    <a:effectLst/>
+                    <a:uLnTx/>
+                    <a:uFillTx/>
+                    <a:latin typeface="Calibri"/>
+                    <a:ea typeface="+mn-ea"/>
+                    <a:cs typeface="+mn-cs"/>
+                  </a:endParaRPr>
+                </a:p>
+              </p:txBody>
+            </p:sp>
+            <p:cxnSp>
+              <p:nvCxnSpPr>
+                <p:cNvPr id="23" name="Straight Connector 22">
+                  <a:extLst>
+                    <a:ext uri="{FF2B5EF4-FFF2-40B4-BE49-F238E27FC236}">
+                      <a16:creationId xmlns:a16="http://schemas.microsoft.com/office/drawing/2014/main" id="{57B695E3-7D94-98C5-949E-0EF141DF5B64}"/>
+                    </a:ext>
+                  </a:extLst>
+                </p:cNvPr>
+                <p:cNvCxnSpPr>
+                  <a:stCxn id="11" idx="0"/>
+                  <a:endCxn id="22" idx="4"/>
+                </p:cNvCxnSpPr>
+                <p:nvPr/>
+              </p:nvCxnSpPr>
+              <p:spPr>
+                <a:xfrm flipH="1" flipV="1">
+                  <a:off x="3461833" y="4466160"/>
+                  <a:ext cx="4835" cy="679613"/>
+                </a:xfrm>
+                <a:prstGeom prst="line">
+                  <a:avLst/>
+                </a:prstGeom>
+                <a:ln>
+                  <a:solidFill>
+                    <a:schemeClr val="tx1"/>
+                  </a:solidFill>
+                </a:ln>
+              </p:spPr>
+              <p:style>
+                <a:lnRef idx="2">
+                  <a:schemeClr val="accent3">
+                    <a:shade val="50000"/>
+                  </a:schemeClr>
+                </a:lnRef>
+                <a:fillRef idx="1">
+                  <a:schemeClr val="accent3"/>
+                </a:fillRef>
+                <a:effectRef idx="0">
+                  <a:schemeClr val="accent3"/>
+                </a:effectRef>
+                <a:fontRef idx="minor">
+                  <a:schemeClr val="lt1"/>
+                </a:fontRef>
+              </p:style>
+            </p:cxnSp>
+          </p:grpSp>
+          <p:sp>
+            <p:nvSpPr>
+              <p:cNvPr id="24" name="InSlideAnimateShape35e178af-dc40-47a5-bc21-4d0e6ab13a0b">
+                <a:extLst>
+                  <a:ext uri="{FF2B5EF4-FFF2-40B4-BE49-F238E27FC236}">
+                    <a16:creationId xmlns:a16="http://schemas.microsoft.com/office/drawing/2014/main" id="{240816F2-4BCB-41CA-136E-0C7C1F22A1F2}"/>
+                  </a:ext>
+                </a:extLst>
+              </p:cNvPr>
+              <p:cNvSpPr txBox="1"/>
+              <p:nvPr/>
+            </p:nvSpPr>
+            <p:spPr>
+              <a:xfrm flipH="1">
+                <a:off x="3244456" y="3886884"/>
+                <a:ext cx="850689" cy="369332"/>
+              </a:xfrm>
+              <a:prstGeom prst="rightArrow">
+                <a:avLst>
+                  <a:gd name="adj1" fmla="val 100000"/>
+                  <a:gd name="adj2" fmla="val 22939"/>
+                </a:avLst>
+              </a:prstGeom>
+              <a:solidFill>
+                <a:schemeClr val="tx1"/>
+              </a:solidFill>
+              <a:ln>
+                <a:solidFill>
+                  <a:schemeClr val="tx1"/>
+                </a:solidFill>
+              </a:ln>
+            </p:spPr>
+            <p:txBody>
+              <a:bodyPr wrap="square" lIns="0" rIns="0" rtlCol="0">
+                <a:spAutoFit/>
+              </a:bodyPr>
+              <a:lstStyle/>
+              <a:p>
+                <a:pPr marL="0" marR="0" lvl="0" indent="0" algn="l" defTabSz="914400" rtl="0" eaLnBrk="1" fontAlgn="auto" latinLnBrk="0" hangingPunct="1">
+                  <a:lnSpc>
+                    <a:spcPct val="100000"/>
+                  </a:lnSpc>
+                  <a:spcBef>
+                    <a:spcPts val="0"/>
+                  </a:spcBef>
+                  <a:spcAft>
+                    <a:spcPts val="0"/>
+                  </a:spcAft>
+                  <a:buClrTx/>
+                  <a:buSzTx/>
+                  <a:buFontTx/>
+                  <a:buNone/>
+                  <a:tabLst/>
+                  <a:defRPr/>
+                </a:pPr>
+                <a:r>
+                  <a:rPr kumimoji="0" lang="en-US" sz="1800" b="0" i="0" u="none" strike="noStrike" kern="1200" cap="none" spc="0" normalizeH="0" baseline="0" noProof="0" dirty="0">
+                    <a:ln>
+                      <a:noFill/>
+                    </a:ln>
+                    <a:solidFill>
+                      <a:srgbClr val="F79646">
+                        <a:lumMod val="60000"/>
+                        <a:lumOff val="40000"/>
+                      </a:srgbClr>
+                    </a:solidFill>
+                    <a:effectLst/>
+                    <a:uLnTx/>
+                    <a:uFillTx/>
+                    <a:latin typeface="Consolas" panose="020B0609020204030204" pitchFamily="49" charset="0"/>
+                    <a:ea typeface="+mn-ea"/>
+                    <a:cs typeface="+mn-cs"/>
+                  </a:rPr>
+                  <a:t>master</a:t>
+                </a:r>
+              </a:p>
+            </p:txBody>
+          </p:sp>
+          <p:cxnSp>
+            <p:nvCxnSpPr>
+              <p:cNvPr id="29" name="Straight Connector 28">
+                <a:extLst>
+                  <a:ext uri="{FF2B5EF4-FFF2-40B4-BE49-F238E27FC236}">
+                    <a16:creationId xmlns:a16="http://schemas.microsoft.com/office/drawing/2014/main" id="{3F4C5A94-4FE5-56C5-4D28-A2E9680852B1}"/>
+                  </a:ext>
+                </a:extLst>
+              </p:cNvPr>
+              <p:cNvCxnSpPr>
+                <a:cxnSpLocks/>
+              </p:cNvCxnSpPr>
+              <p:nvPr/>
+            </p:nvCxnSpPr>
+            <p:spPr>
+              <a:xfrm>
+                <a:off x="-74189" y="3241970"/>
+                <a:ext cx="0" cy="3287970"/>
+              </a:xfrm>
+              <a:prstGeom prst="line">
+                <a:avLst/>
+              </a:prstGeom>
+              <a:ln w="19050">
+                <a:solidFill>
+                  <a:schemeClr val="bg1">
+                    <a:lumMod val="65000"/>
+                  </a:schemeClr>
+                </a:solidFill>
+                <a:prstDash val="sysDash"/>
+              </a:ln>
+            </p:spPr>
+            <p:style>
+              <a:lnRef idx="1">
+                <a:schemeClr val="accent1"/>
+              </a:lnRef>
+              <a:fillRef idx="0">
+                <a:schemeClr val="accent1"/>
+              </a:fillRef>
+              <a:effectRef idx="0">
+                <a:schemeClr val="accent1"/>
+              </a:effectRef>
+              <a:fontRef idx="minor">
+                <a:schemeClr val="tx1"/>
+              </a:fontRef>
+            </p:style>
+          </p:cxnSp>
+          <p:sp>
+            <p:nvSpPr>
+              <p:cNvPr id="30" name="Down Arrow 71">
+                <a:extLst>
+                  <a:ext uri="{FF2B5EF4-FFF2-40B4-BE49-F238E27FC236}">
+                    <a16:creationId xmlns:a16="http://schemas.microsoft.com/office/drawing/2014/main" id="{52D4A782-32EC-2E9E-26D0-C95ECA75AEDF}"/>
+                  </a:ext>
+                </a:extLst>
+              </p:cNvPr>
+              <p:cNvSpPr/>
+              <p:nvPr/>
+            </p:nvSpPr>
+            <p:spPr>
+              <a:xfrm rot="16200000">
+                <a:off x="-392985" y="5460745"/>
+                <a:ext cx="432048" cy="391906"/>
+              </a:xfrm>
+              <a:prstGeom prst="downArrow">
+                <a:avLst/>
+              </a:prstGeom>
+              <a:solidFill>
+                <a:schemeClr val="bg1">
+                  <a:lumMod val="85000"/>
+                </a:schemeClr>
+              </a:solidFill>
+              <a:ln>
+                <a:solidFill>
+                  <a:schemeClr val="bg1">
+                    <a:lumMod val="65000"/>
+                  </a:schemeClr>
+                </a:solidFill>
+              </a:ln>
+            </p:spPr>
+            <p:style>
+              <a:lnRef idx="2">
+                <a:schemeClr val="accent1">
+                  <a:shade val="50000"/>
+                </a:schemeClr>
+              </a:lnRef>
+              <a:fillRef idx="1">
+                <a:schemeClr val="accent1"/>
+              </a:fillRef>
+              <a:effectRef idx="0">
+                <a:schemeClr val="accent1"/>
+              </a:effectRef>
+              <a:fontRef idx="minor">
+                <a:schemeClr val="lt1"/>
+              </a:fontRef>
+            </p:style>
+            <p:txBody>
+              <a:bodyPr rtlCol="0" anchor="ctr"/>
+              <a:lstStyle/>
+              <a:p>
+                <a:pPr algn="ctr"/>
+                <a:endParaRPr lang="en-US"/>
+              </a:p>
+            </p:txBody>
+          </p:sp>
         </p:grpSp>
-        <p:sp>
-          <p:nvSpPr>
-            <p:cNvPr id="24" name="InSlideAnimateShape35e178af-dc40-47a5-bc21-4d0e6ab13a0b">
+        <p:grpSp>
+          <p:nvGrpSpPr>
+            <p:cNvPr id="28" name="Group 27">
               <a:extLst>
                 <a:ext uri="{FF2B5EF4-FFF2-40B4-BE49-F238E27FC236}">
-                  <a16:creationId xmlns:a16="http://schemas.microsoft.com/office/drawing/2014/main" id="{240816F2-4BCB-41CA-136E-0C7C1F22A1F2}"/>
+                  <a16:creationId xmlns:a16="http://schemas.microsoft.com/office/drawing/2014/main" id="{259E97BC-62FC-1599-12FC-B2A9A6328DAE}"/>
                 </a:ext>
               </a:extLst>
             </p:cNvPr>
-            <p:cNvSpPr txBox="1"/>
+            <p:cNvGrpSpPr/>
             <p:nvPr/>
-          </p:nvSpPr>
-          <p:spPr>
-            <a:xfrm flipH="1">
-              <a:off x="3244456" y="3886884"/>
-              <a:ext cx="850689" cy="369332"/>
+          </p:nvGrpSpPr>
+          <p:grpSpPr>
+            <a:xfrm>
+              <a:off x="322583" y="4185440"/>
+              <a:ext cx="2126422" cy="2034063"/>
+              <a:chOff x="6987577" y="4440181"/>
+              <a:chExt cx="2126422" cy="2034063"/>
             </a:xfrm>
-            <a:prstGeom prst="rightArrow">
-              <a:avLst>
-                <a:gd name="adj1" fmla="val 100000"/>
-                <a:gd name="adj2" fmla="val 22939"/>
-              </a:avLst>
-            </a:prstGeom>
-            <a:solidFill>
-              <a:schemeClr val="tx1"/>
-            </a:solidFill>
-            <a:ln>
+          </p:grpSpPr>
+          <p:sp>
+            <p:nvSpPr>
+              <p:cNvPr id="3" name="Flowchart: Connector 61">
+                <a:extLst>
+                  <a:ext uri="{FF2B5EF4-FFF2-40B4-BE49-F238E27FC236}">
+                    <a16:creationId xmlns:a16="http://schemas.microsoft.com/office/drawing/2014/main" id="{C81D9783-AF44-543C-7A87-B5BDDB3AEB4C}"/>
+                  </a:ext>
+                </a:extLst>
+              </p:cNvPr>
+              <p:cNvSpPr/>
+              <p:nvPr/>
+            </p:nvSpPr>
+            <p:spPr>
+              <a:xfrm>
+                <a:off x="6998519" y="5274441"/>
+                <a:ext cx="529341" cy="458946"/>
+              </a:xfrm>
+              <a:prstGeom prst="flowChartConnector">
+                <a:avLst/>
+              </a:prstGeom>
+              <a:solidFill>
+                <a:schemeClr val="accent6"/>
+              </a:solidFill>
+              <a:ln>
+                <a:solidFill>
+                  <a:schemeClr val="tx1"/>
+                </a:solidFill>
+              </a:ln>
+            </p:spPr>
+            <p:style>
+              <a:lnRef idx="2">
+                <a:schemeClr val="accent3">
+                  <a:shade val="50000"/>
+                </a:schemeClr>
+              </a:lnRef>
+              <a:fillRef idx="1">
+                <a:schemeClr val="accent3"/>
+              </a:fillRef>
+              <a:effectRef idx="0">
+                <a:schemeClr val="accent3"/>
+              </a:effectRef>
+              <a:fontRef idx="minor">
+                <a:schemeClr val="lt1"/>
+              </a:fontRef>
+            </p:style>
+            <p:txBody>
+              <a:bodyPr rtlCol="0" anchor="ctr"/>
+              <a:lstStyle/>
+              <a:p>
+                <a:pPr marL="0" marR="0" lvl="0" indent="0" algn="ctr" defTabSz="914400" rtl="0" eaLnBrk="1" fontAlgn="auto" latinLnBrk="0" hangingPunct="1">
+                  <a:lnSpc>
+                    <a:spcPct val="100000"/>
+                  </a:lnSpc>
+                  <a:spcBef>
+                    <a:spcPts val="0"/>
+                  </a:spcBef>
+                  <a:spcAft>
+                    <a:spcPts val="0"/>
+                  </a:spcAft>
+                  <a:buClrTx/>
+                  <a:buSzTx/>
+                  <a:buFontTx/>
+                  <a:buNone/>
+                  <a:tabLst/>
+                  <a:defRPr/>
+                </a:pPr>
+                <a:r>
+                  <a:rPr kumimoji="0" lang="en-US" sz="1800" b="0" i="0" u="none" strike="noStrike" kern="1200" cap="none" spc="0" normalizeH="0" baseline="0" noProof="0" dirty="0">
+                    <a:ln>
+                      <a:noFill/>
+                    </a:ln>
+                    <a:solidFill>
+                      <a:prstClr val="white"/>
+                    </a:solidFill>
+                    <a:effectLst/>
+                    <a:uLnTx/>
+                    <a:uFillTx/>
+                    <a:latin typeface="Calibri"/>
+                    <a:ea typeface="+mn-ea"/>
+                    <a:cs typeface="+mn-cs"/>
+                  </a:rPr>
+                  <a:t>b</a:t>
+                </a:r>
+              </a:p>
+            </p:txBody>
+          </p:sp>
+          <p:sp>
+            <p:nvSpPr>
+              <p:cNvPr id="5" name="Flowchart: Connector 62">
+                <a:extLst>
+                  <a:ext uri="{FF2B5EF4-FFF2-40B4-BE49-F238E27FC236}">
+                    <a16:creationId xmlns:a16="http://schemas.microsoft.com/office/drawing/2014/main" id="{A1DB4EE6-2C2B-B6DE-F3B6-4D1602584D91}"/>
+                  </a:ext>
+                </a:extLst>
+              </p:cNvPr>
+              <p:cNvSpPr/>
+              <p:nvPr/>
+            </p:nvSpPr>
+            <p:spPr>
+              <a:xfrm>
+                <a:off x="6992034" y="6015298"/>
+                <a:ext cx="529341" cy="458946"/>
+              </a:xfrm>
+              <a:prstGeom prst="flowChartConnector">
+                <a:avLst/>
+              </a:prstGeom>
+              <a:solidFill>
+                <a:schemeClr val="accent6"/>
+              </a:solidFill>
+              <a:ln>
+                <a:solidFill>
+                  <a:schemeClr val="tx1"/>
+                </a:solidFill>
+              </a:ln>
+            </p:spPr>
+            <p:style>
+              <a:lnRef idx="2">
+                <a:schemeClr val="accent3">
+                  <a:shade val="50000"/>
+                </a:schemeClr>
+              </a:lnRef>
+              <a:fillRef idx="1">
+                <a:schemeClr val="accent3"/>
+              </a:fillRef>
+              <a:effectRef idx="0">
+                <a:schemeClr val="accent3"/>
+              </a:effectRef>
+              <a:fontRef idx="minor">
+                <a:schemeClr val="lt1"/>
+              </a:fontRef>
+            </p:style>
+            <p:txBody>
+              <a:bodyPr rtlCol="0" anchor="ctr"/>
+              <a:lstStyle/>
+              <a:p>
+                <a:pPr marL="0" marR="0" lvl="0" indent="0" algn="ctr" defTabSz="914400" rtl="0" eaLnBrk="1" fontAlgn="auto" latinLnBrk="0" hangingPunct="1">
+                  <a:lnSpc>
+                    <a:spcPct val="100000"/>
+                  </a:lnSpc>
+                  <a:spcBef>
+                    <a:spcPts val="0"/>
+                  </a:spcBef>
+                  <a:spcAft>
+                    <a:spcPts val="0"/>
+                  </a:spcAft>
+                  <a:buClrTx/>
+                  <a:buSzTx/>
+                  <a:buFontTx/>
+                  <a:buNone/>
+                  <a:tabLst/>
+                  <a:defRPr/>
+                </a:pPr>
+                <a:r>
+                  <a:rPr kumimoji="0" lang="en-US" sz="1800" b="0" i="0" u="none" strike="noStrike" kern="1200" cap="none" spc="0" normalizeH="0" baseline="0" noProof="0" dirty="0">
+                    <a:ln>
+                      <a:noFill/>
+                    </a:ln>
+                    <a:solidFill>
+                      <a:prstClr val="white"/>
+                    </a:solidFill>
+                    <a:effectLst/>
+                    <a:uLnTx/>
+                    <a:uFillTx/>
+                    <a:latin typeface="Calibri"/>
+                    <a:ea typeface="+mn-ea"/>
+                    <a:cs typeface="+mn-cs"/>
+                  </a:rPr>
+                  <a:t>a</a:t>
+                </a:r>
+              </a:p>
+            </p:txBody>
+          </p:sp>
+          <p:cxnSp>
+            <p:nvCxnSpPr>
+              <p:cNvPr id="6" name="Straight Connector 5">
+                <a:extLst>
+                  <a:ext uri="{FF2B5EF4-FFF2-40B4-BE49-F238E27FC236}">
+                    <a16:creationId xmlns:a16="http://schemas.microsoft.com/office/drawing/2014/main" id="{3A53D99E-FF3C-D2AB-FA23-1BDF2356B0C8}"/>
+                  </a:ext>
+                </a:extLst>
+              </p:cNvPr>
+              <p:cNvCxnSpPr>
+                <a:stCxn id="5" idx="0"/>
+                <a:endCxn id="3" idx="4"/>
+              </p:cNvCxnSpPr>
+              <p:nvPr/>
+            </p:nvCxnSpPr>
+            <p:spPr>
+              <a:xfrm flipV="1">
+                <a:off x="7256705" y="5733387"/>
+                <a:ext cx="6485" cy="281911"/>
+              </a:xfrm>
+              <a:prstGeom prst="line">
+                <a:avLst/>
+              </a:prstGeom>
+              <a:solidFill>
+                <a:srgbClr val="C00000"/>
+              </a:solidFill>
+              <a:ln>
+                <a:solidFill>
+                  <a:schemeClr val="tx1"/>
+                </a:solidFill>
+              </a:ln>
+            </p:spPr>
+            <p:style>
+              <a:lnRef idx="2">
+                <a:schemeClr val="accent3">
+                  <a:shade val="50000"/>
+                </a:schemeClr>
+              </a:lnRef>
+              <a:fillRef idx="1">
+                <a:schemeClr val="accent3"/>
+              </a:fillRef>
+              <a:effectRef idx="0">
+                <a:schemeClr val="accent3"/>
+              </a:effectRef>
+              <a:fontRef idx="minor">
+                <a:schemeClr val="lt1"/>
+              </a:fontRef>
+            </p:style>
+          </p:cxnSp>
+          <p:grpSp>
+            <p:nvGrpSpPr>
+              <p:cNvPr id="14" name="branch: commit 4">
+                <a:extLst>
+                  <a:ext uri="{FF2B5EF4-FFF2-40B4-BE49-F238E27FC236}">
+                    <a16:creationId xmlns:a16="http://schemas.microsoft.com/office/drawing/2014/main" id="{D5963669-F4A2-09E4-5875-A2DE3EF0C6D2}"/>
+                  </a:ext>
+                </a:extLst>
+              </p:cNvPr>
+              <p:cNvGrpSpPr/>
+              <p:nvPr/>
+            </p:nvGrpSpPr>
+            <p:grpSpPr>
+              <a:xfrm>
+                <a:off x="6987577" y="4440181"/>
+                <a:ext cx="529341" cy="834260"/>
+                <a:chOff x="2338635" y="4018315"/>
+                <a:chExt cx="529341" cy="834260"/>
+              </a:xfrm>
+            </p:grpSpPr>
+            <p:sp>
+              <p:nvSpPr>
+                <p:cNvPr id="18" name="Flowchart: Connector 65">
+                  <a:extLst>
+                    <a:ext uri="{FF2B5EF4-FFF2-40B4-BE49-F238E27FC236}">
+                      <a16:creationId xmlns:a16="http://schemas.microsoft.com/office/drawing/2014/main" id="{2F247366-E88D-3723-13F9-D875A179B16F}"/>
+                    </a:ext>
+                  </a:extLst>
+                </p:cNvPr>
+                <p:cNvSpPr/>
+                <p:nvPr/>
+              </p:nvSpPr>
+              <p:spPr>
+                <a:xfrm>
+                  <a:off x="2338635" y="4018315"/>
+                  <a:ext cx="529341" cy="458946"/>
+                </a:xfrm>
+                <a:prstGeom prst="flowChartConnector">
+                  <a:avLst/>
+                </a:prstGeom>
+                <a:solidFill>
+                  <a:srgbClr val="0070C0"/>
+                </a:solidFill>
+                <a:ln>
+                  <a:solidFill>
+                    <a:schemeClr val="tx1"/>
+                  </a:solidFill>
+                </a:ln>
+              </p:spPr>
+              <p:style>
+                <a:lnRef idx="2">
+                  <a:schemeClr val="accent3">
+                    <a:shade val="50000"/>
+                  </a:schemeClr>
+                </a:lnRef>
+                <a:fillRef idx="1">
+                  <a:schemeClr val="accent3"/>
+                </a:fillRef>
+                <a:effectRef idx="0">
+                  <a:schemeClr val="accent3"/>
+                </a:effectRef>
+                <a:fontRef idx="minor">
+                  <a:schemeClr val="lt1"/>
+                </a:fontRef>
+              </p:style>
+              <p:txBody>
+                <a:bodyPr rtlCol="0" anchor="ctr"/>
+                <a:lstStyle/>
+                <a:p>
+                  <a:pPr marL="0" marR="0" lvl="0" indent="0" algn="ctr" defTabSz="914400" rtl="0" eaLnBrk="1" fontAlgn="auto" latinLnBrk="0" hangingPunct="1">
+                    <a:lnSpc>
+                      <a:spcPct val="100000"/>
+                    </a:lnSpc>
+                    <a:spcBef>
+                      <a:spcPts val="0"/>
+                    </a:spcBef>
+                    <a:spcAft>
+                      <a:spcPts val="0"/>
+                    </a:spcAft>
+                    <a:buClrTx/>
+                    <a:buSzTx/>
+                    <a:buFontTx/>
+                    <a:buNone/>
+                    <a:tabLst/>
+                    <a:defRPr/>
+                  </a:pPr>
+                  <a:r>
+                    <a:rPr kumimoji="0" lang="en-US" sz="1800" b="0" i="0" u="none" strike="noStrike" kern="1200" cap="none" spc="0" normalizeH="0" baseline="0" noProof="0" dirty="0">
+                      <a:ln>
+                        <a:noFill/>
+                      </a:ln>
+                      <a:solidFill>
+                        <a:prstClr val="white"/>
+                      </a:solidFill>
+                      <a:effectLst/>
+                      <a:uLnTx/>
+                      <a:uFillTx/>
+                      <a:latin typeface="Calibri"/>
+                      <a:ea typeface="+mn-ea"/>
+                      <a:cs typeface="+mn-cs"/>
+                    </a:rPr>
+                    <a:t>c</a:t>
+                  </a:r>
+                </a:p>
+              </p:txBody>
+            </p:sp>
+            <p:cxnSp>
+              <p:nvCxnSpPr>
+                <p:cNvPr id="19" name="Straight Connector 18">
+                  <a:extLst>
+                    <a:ext uri="{FF2B5EF4-FFF2-40B4-BE49-F238E27FC236}">
+                      <a16:creationId xmlns:a16="http://schemas.microsoft.com/office/drawing/2014/main" id="{DDE9F6DD-67ED-B3FE-C1D9-9580F7E24DEC}"/>
+                    </a:ext>
+                  </a:extLst>
+                </p:cNvPr>
+                <p:cNvCxnSpPr>
+                  <a:stCxn id="3" idx="0"/>
+                  <a:endCxn id="18" idx="4"/>
+                </p:cNvCxnSpPr>
+                <p:nvPr/>
+              </p:nvCxnSpPr>
+              <p:spPr>
+                <a:xfrm flipH="1" flipV="1">
+                  <a:off x="2603306" y="4477261"/>
+                  <a:ext cx="10942" cy="375314"/>
+                </a:xfrm>
+                <a:prstGeom prst="line">
+                  <a:avLst/>
+                </a:prstGeom>
+                <a:ln>
+                  <a:solidFill>
+                    <a:schemeClr val="tx1"/>
+                  </a:solidFill>
+                </a:ln>
+              </p:spPr>
+              <p:style>
+                <a:lnRef idx="2">
+                  <a:schemeClr val="accent3">
+                    <a:shade val="50000"/>
+                  </a:schemeClr>
+                </a:lnRef>
+                <a:fillRef idx="1">
+                  <a:schemeClr val="accent3"/>
+                </a:fillRef>
+                <a:effectRef idx="0">
+                  <a:schemeClr val="accent3"/>
+                </a:effectRef>
+                <a:fontRef idx="minor">
+                  <a:schemeClr val="lt1"/>
+                </a:fontRef>
+              </p:style>
+            </p:cxnSp>
+          </p:grpSp>
+          <p:sp>
+            <p:nvSpPr>
+              <p:cNvPr id="20" name="InSlideAnimateShapef6670a49-3898-4e8c-8403-b30b80627c4a">
+                <a:extLst>
+                  <a:ext uri="{FF2B5EF4-FFF2-40B4-BE49-F238E27FC236}">
+                    <a16:creationId xmlns:a16="http://schemas.microsoft.com/office/drawing/2014/main" id="{68C79A36-D184-EC2B-810D-73F43007E302}"/>
+                  </a:ext>
+                </a:extLst>
+              </p:cNvPr>
+              <p:cNvSpPr txBox="1">
+                <a:spLocks/>
+              </p:cNvSpPr>
+              <p:nvPr/>
+            </p:nvSpPr>
+            <p:spPr>
+              <a:xfrm flipH="1">
+                <a:off x="7600623" y="4482117"/>
+                <a:ext cx="607226" cy="369332"/>
+              </a:xfrm>
+              <a:prstGeom prst="rightArrow">
+                <a:avLst>
+                  <a:gd name="adj1" fmla="val 100000"/>
+                  <a:gd name="adj2" fmla="val 22939"/>
+                </a:avLst>
+              </a:prstGeom>
               <a:solidFill>
                 <a:schemeClr val="tx1"/>
               </a:solidFill>
-            </a:ln>
-          </p:spPr>
-          <p:txBody>
-            <a:bodyPr wrap="square" lIns="0" rIns="0" rtlCol="0">
-              <a:spAutoFit/>
-            </a:bodyPr>
-            <a:lstStyle/>
-            <a:p>
-              <a:pPr marL="0" marR="0" lvl="0" indent="0" algn="l" defTabSz="914400" rtl="0" eaLnBrk="1" fontAlgn="auto" latinLnBrk="0" hangingPunct="1">
-                <a:lnSpc>
-                  <a:spcPct val="100000"/>
-                </a:lnSpc>
-                <a:spcBef>
-                  <a:spcPts val="0"/>
-                </a:spcBef>
-                <a:spcAft>
-                  <a:spcPts val="0"/>
-                </a:spcAft>
-                <a:buClrTx/>
-                <a:buSzTx/>
-                <a:buFontTx/>
-                <a:buNone/>
-                <a:tabLst/>
-                <a:defRPr/>
-              </a:pPr>
-              <a:r>
-                <a:rPr kumimoji="0" lang="en-US" sz="1800" b="0" i="0" u="none" strike="noStrike" kern="1200" cap="none" spc="0" normalizeH="0" baseline="0" noProof="0" dirty="0">
-                  <a:ln>
-                    <a:noFill/>
-                  </a:ln>
-                  <a:solidFill>
-                    <a:srgbClr val="F79646">
-                      <a:lumMod val="60000"/>
-                      <a:lumOff val="40000"/>
-                    </a:srgbClr>
-                  </a:solidFill>
-                  <a:effectLst/>
-                  <a:uLnTx/>
-                  <a:uFillTx/>
-                  <a:latin typeface="Consolas" panose="020B0609020204030204" pitchFamily="49" charset="0"/>
-                  <a:ea typeface="+mn-ea"/>
-                  <a:cs typeface="+mn-cs"/>
-                </a:rPr>
-                <a:t>master</a:t>
-              </a:r>
-            </a:p>
-          </p:txBody>
-        </p:sp>
+              <a:ln>
+                <a:solidFill>
+                  <a:schemeClr val="tx1"/>
+                </a:solidFill>
+              </a:ln>
+            </p:spPr>
+            <p:txBody>
+              <a:bodyPr wrap="square" lIns="0" rIns="0" rtlCol="0">
+                <a:spAutoFit/>
+              </a:bodyPr>
+              <a:lstStyle/>
+              <a:p>
+                <a:pPr marL="0" marR="0" lvl="0" indent="0" algn="l" defTabSz="914400" rtl="0" eaLnBrk="1" fontAlgn="auto" latinLnBrk="0" hangingPunct="1">
+                  <a:lnSpc>
+                    <a:spcPct val="100000"/>
+                  </a:lnSpc>
+                  <a:spcBef>
+                    <a:spcPts val="0"/>
+                  </a:spcBef>
+                  <a:spcAft>
+                    <a:spcPts val="0"/>
+                  </a:spcAft>
+                  <a:buClrTx/>
+                  <a:buSzTx/>
+                  <a:buFontTx/>
+                  <a:buNone/>
+                  <a:tabLst/>
+                  <a:defRPr/>
+                </a:pPr>
+                <a:r>
+                  <a:rPr kumimoji="0" lang="en-US" sz="1800" b="0" i="0" u="none" strike="noStrike" kern="1200" cap="none" spc="0" normalizeH="0" baseline="0" noProof="0" dirty="0">
+                    <a:ln>
+                      <a:noFill/>
+                    </a:ln>
+                    <a:solidFill>
+                      <a:srgbClr val="00B0F0"/>
+                    </a:solidFill>
+                    <a:effectLst/>
+                    <a:uLnTx/>
+                    <a:uFillTx/>
+                    <a:latin typeface="Consolas" panose="020B0609020204030204" pitchFamily="49" charset="0"/>
+                    <a:ea typeface="+mn-ea"/>
+                    <a:cs typeface="+mn-cs"/>
+                  </a:rPr>
+                  <a:t>fix1</a:t>
+                </a:r>
+              </a:p>
+            </p:txBody>
+          </p:sp>
+          <p:sp>
+            <p:nvSpPr>
+              <p:cNvPr id="25" name="InSlideAnimateShape35e178af-dc40-47a5-bc21-4d0e6ab13a0b">
+                <a:extLst>
+                  <a:ext uri="{FF2B5EF4-FFF2-40B4-BE49-F238E27FC236}">
+                    <a16:creationId xmlns:a16="http://schemas.microsoft.com/office/drawing/2014/main" id="{191575C2-DF17-ECC9-83AE-1452C51F0928}"/>
+                  </a:ext>
+                </a:extLst>
+              </p:cNvPr>
+              <p:cNvSpPr txBox="1"/>
+              <p:nvPr/>
+            </p:nvSpPr>
+            <p:spPr>
+              <a:xfrm flipH="1">
+                <a:off x="7609008" y="5313473"/>
+                <a:ext cx="850689" cy="369332"/>
+              </a:xfrm>
+              <a:prstGeom prst="rightArrow">
+                <a:avLst>
+                  <a:gd name="adj1" fmla="val 100000"/>
+                  <a:gd name="adj2" fmla="val 22939"/>
+                </a:avLst>
+              </a:prstGeom>
+              <a:solidFill>
+                <a:schemeClr val="tx1"/>
+              </a:solidFill>
+              <a:ln>
+                <a:solidFill>
+                  <a:schemeClr val="tx1"/>
+                </a:solidFill>
+              </a:ln>
+            </p:spPr>
+            <p:txBody>
+              <a:bodyPr wrap="square" lIns="0" rIns="0" rtlCol="0">
+                <a:spAutoFit/>
+              </a:bodyPr>
+              <a:lstStyle/>
+              <a:p>
+                <a:pPr marL="0" marR="0" lvl="0" indent="0" algn="l" defTabSz="914400" rtl="0" eaLnBrk="1" fontAlgn="auto" latinLnBrk="0" hangingPunct="1">
+                  <a:lnSpc>
+                    <a:spcPct val="100000"/>
+                  </a:lnSpc>
+                  <a:spcBef>
+                    <a:spcPts val="0"/>
+                  </a:spcBef>
+                  <a:spcAft>
+                    <a:spcPts val="0"/>
+                  </a:spcAft>
+                  <a:buClrTx/>
+                  <a:buSzTx/>
+                  <a:buFontTx/>
+                  <a:buNone/>
+                  <a:tabLst/>
+                  <a:defRPr/>
+                </a:pPr>
+                <a:r>
+                  <a:rPr kumimoji="0" lang="en-US" sz="1800" b="0" i="0" u="none" strike="noStrike" kern="1200" cap="none" spc="0" normalizeH="0" baseline="0" noProof="0" dirty="0">
+                    <a:ln>
+                      <a:noFill/>
+                    </a:ln>
+                    <a:solidFill>
+                      <a:srgbClr val="F79646">
+                        <a:lumMod val="60000"/>
+                        <a:lumOff val="40000"/>
+                      </a:srgbClr>
+                    </a:solidFill>
+                    <a:effectLst/>
+                    <a:uLnTx/>
+                    <a:uFillTx/>
+                    <a:latin typeface="Consolas" panose="020B0609020204030204" pitchFamily="49" charset="0"/>
+                    <a:ea typeface="+mn-ea"/>
+                    <a:cs typeface="+mn-cs"/>
+                  </a:rPr>
+                  <a:t>master</a:t>
+                </a:r>
+              </a:p>
+            </p:txBody>
+          </p:sp>
+          <p:sp>
+            <p:nvSpPr>
+              <p:cNvPr id="26" name="InSlideAnimateShapec6668a60-df72-441d-a462-fbf247f668dd">
+                <a:extLst>
+                  <a:ext uri="{FF2B5EF4-FFF2-40B4-BE49-F238E27FC236}">
+                    <a16:creationId xmlns:a16="http://schemas.microsoft.com/office/drawing/2014/main" id="{A345EFAE-9AC3-8F59-51A4-67F1C3105ADB}"/>
+                  </a:ext>
+                </a:extLst>
+              </p:cNvPr>
+              <p:cNvSpPr txBox="1"/>
+              <p:nvPr/>
+            </p:nvSpPr>
+            <p:spPr>
+              <a:xfrm>
+                <a:off x="8495990" y="5307732"/>
+                <a:ext cx="618009" cy="375073"/>
+              </a:xfrm>
+              <a:prstGeom prst="roundRect">
+                <a:avLst/>
+              </a:prstGeom>
+              <a:solidFill>
+                <a:schemeClr val="tx1"/>
+              </a:solidFill>
+              <a:ln>
+                <a:solidFill>
+                  <a:schemeClr val="tx1"/>
+                </a:solidFill>
+              </a:ln>
+            </p:spPr>
+            <p:txBody>
+              <a:bodyPr wrap="square" lIns="0" tIns="0" rIns="0" bIns="0" rtlCol="0" anchor="ctr">
+                <a:noAutofit/>
+              </a:bodyPr>
+              <a:lstStyle/>
+              <a:p>
+                <a:pPr marL="0" marR="0" lvl="0" indent="0" algn="ctr" defTabSz="914400" rtl="0" eaLnBrk="1" fontAlgn="auto" latinLnBrk="0" hangingPunct="1">
+                  <a:lnSpc>
+                    <a:spcPct val="100000"/>
+                  </a:lnSpc>
+                  <a:spcBef>
+                    <a:spcPts val="0"/>
+                  </a:spcBef>
+                  <a:spcAft>
+                    <a:spcPts val="0"/>
+                  </a:spcAft>
+                  <a:buClrTx/>
+                  <a:buSzTx/>
+                  <a:buFontTx/>
+                  <a:buNone/>
+                  <a:tabLst/>
+                  <a:defRPr/>
+                </a:pPr>
+                <a:r>
+                  <a:rPr kumimoji="0" lang="en-US" sz="1800" b="1" i="0" u="none" strike="noStrike" kern="1200" cap="none" spc="0" normalizeH="0" baseline="0" noProof="0" dirty="0">
+                    <a:ln>
+                      <a:noFill/>
+                    </a:ln>
+                    <a:solidFill>
+                      <a:srgbClr val="FFFF00"/>
+                    </a:solidFill>
+                    <a:effectLst/>
+                    <a:uLnTx/>
+                    <a:uFillTx/>
+                    <a:latin typeface="Consolas" panose="020B0609020204030204" pitchFamily="49" charset="0"/>
+                    <a:ea typeface="+mn-ea"/>
+                    <a:cs typeface="+mn-cs"/>
+                  </a:rPr>
+                  <a:t>HEAD</a:t>
+                </a:r>
+              </a:p>
+            </p:txBody>
+          </p:sp>
+        </p:grpSp>
       </p:grpSp>
     </p:spTree>
     <p:extLst>

</xml_diff>